<commit_message>
Added more content to the tutorial.
</commit_message>
<xml_diff>
--- a/docs/source/Figures/ArtWork.pptx
+++ b/docs/source/Figures/ArtWork.pptx
@@ -5,12 +5,13 @@
     <p:sldMasterId id="2147483648" r:id="rId1"/>
   </p:sldMasterIdLst>
   <p:notesMasterIdLst>
-    <p:notesMasterId r:id="rId5"/>
+    <p:notesMasterId r:id="rId6"/>
   </p:notesMasterIdLst>
   <p:sldIdLst>
     <p:sldId id="256" r:id="rId2"/>
     <p:sldId id="257" r:id="rId3"/>
     <p:sldId id="258" r:id="rId4"/>
+    <p:sldId id="259" r:id="rId5"/>
   </p:sldIdLst>
   <p:sldSz cx="12192000" cy="6858000"/>
   <p:notesSz cx="6858000" cy="9144000"/>
@@ -199,7 +200,7 @@
           <a:p>
             <a:fld id="{5DDFA8E1-0D23-6C43-96F3-550D2E955075}" type="datetimeFigureOut">
               <a:rPr lang="en-US" smtClean="0"/>
-              <a:t>5/10/16</a:t>
+              <a:t>11/4/17</a:t>
             </a:fld>
             <a:endParaRPr lang="en-US"/>
           </a:p>
@@ -682,7 +683,7 @@
           <a:p>
             <a:fld id="{74C0584D-4683-8D49-B4BC-C8CA51812904}" type="datetimeFigureOut">
               <a:rPr lang="en-US" smtClean="0"/>
-              <a:t>5/10/16</a:t>
+              <a:t>11/4/17</a:t>
             </a:fld>
             <a:endParaRPr lang="en-US"/>
           </a:p>
@@ -852,7 +853,7 @@
           <a:p>
             <a:fld id="{74C0584D-4683-8D49-B4BC-C8CA51812904}" type="datetimeFigureOut">
               <a:rPr lang="en-US" smtClean="0"/>
-              <a:t>5/10/16</a:t>
+              <a:t>11/4/17</a:t>
             </a:fld>
             <a:endParaRPr lang="en-US"/>
           </a:p>
@@ -1032,7 +1033,7 @@
           <a:p>
             <a:fld id="{74C0584D-4683-8D49-B4BC-C8CA51812904}" type="datetimeFigureOut">
               <a:rPr lang="en-US" smtClean="0"/>
-              <a:t>5/10/16</a:t>
+              <a:t>11/4/17</a:t>
             </a:fld>
             <a:endParaRPr lang="en-US"/>
           </a:p>
@@ -1202,7 +1203,7 @@
           <a:p>
             <a:fld id="{74C0584D-4683-8D49-B4BC-C8CA51812904}" type="datetimeFigureOut">
               <a:rPr lang="en-US" smtClean="0"/>
-              <a:t>5/10/16</a:t>
+              <a:t>11/4/17</a:t>
             </a:fld>
             <a:endParaRPr lang="en-US"/>
           </a:p>
@@ -1448,7 +1449,7 @@
           <a:p>
             <a:fld id="{74C0584D-4683-8D49-B4BC-C8CA51812904}" type="datetimeFigureOut">
               <a:rPr lang="en-US" smtClean="0"/>
-              <a:t>5/10/16</a:t>
+              <a:t>11/4/17</a:t>
             </a:fld>
             <a:endParaRPr lang="en-US"/>
           </a:p>
@@ -1680,7 +1681,7 @@
           <a:p>
             <a:fld id="{74C0584D-4683-8D49-B4BC-C8CA51812904}" type="datetimeFigureOut">
               <a:rPr lang="en-US" smtClean="0"/>
-              <a:t>5/10/16</a:t>
+              <a:t>11/4/17</a:t>
             </a:fld>
             <a:endParaRPr lang="en-US"/>
           </a:p>
@@ -2047,7 +2048,7 @@
           <a:p>
             <a:fld id="{74C0584D-4683-8D49-B4BC-C8CA51812904}" type="datetimeFigureOut">
               <a:rPr lang="en-US" smtClean="0"/>
-              <a:t>5/10/16</a:t>
+              <a:t>11/4/17</a:t>
             </a:fld>
             <a:endParaRPr lang="en-US"/>
           </a:p>
@@ -2165,7 +2166,7 @@
           <a:p>
             <a:fld id="{74C0584D-4683-8D49-B4BC-C8CA51812904}" type="datetimeFigureOut">
               <a:rPr lang="en-US" smtClean="0"/>
-              <a:t>5/10/16</a:t>
+              <a:t>11/4/17</a:t>
             </a:fld>
             <a:endParaRPr lang="en-US"/>
           </a:p>
@@ -2260,7 +2261,7 @@
           <a:p>
             <a:fld id="{74C0584D-4683-8D49-B4BC-C8CA51812904}" type="datetimeFigureOut">
               <a:rPr lang="en-US" smtClean="0"/>
-              <a:t>5/10/16</a:t>
+              <a:t>11/4/17</a:t>
             </a:fld>
             <a:endParaRPr lang="en-US"/>
           </a:p>
@@ -2537,7 +2538,7 @@
           <a:p>
             <a:fld id="{74C0584D-4683-8D49-B4BC-C8CA51812904}" type="datetimeFigureOut">
               <a:rPr lang="en-US" smtClean="0"/>
-              <a:t>5/10/16</a:t>
+              <a:t>11/4/17</a:t>
             </a:fld>
             <a:endParaRPr lang="en-US"/>
           </a:p>
@@ -2790,7 +2791,7 @@
           <a:p>
             <a:fld id="{74C0584D-4683-8D49-B4BC-C8CA51812904}" type="datetimeFigureOut">
               <a:rPr lang="en-US" smtClean="0"/>
-              <a:t>5/10/16</a:t>
+              <a:t>11/4/17</a:t>
             </a:fld>
             <a:endParaRPr lang="en-US"/>
           </a:p>
@@ -3003,7 +3004,7 @@
           <a:p>
             <a:fld id="{74C0584D-4683-8D49-B4BC-C8CA51812904}" type="datetimeFigureOut">
               <a:rPr lang="en-US" smtClean="0"/>
-              <a:t>5/10/16</a:t>
+              <a:t>11/4/17</a:t>
             </a:fld>
             <a:endParaRPr lang="en-US"/>
           </a:p>
@@ -9373,8 +9374,8 @@
             </p:sp>
           </p:grpSp>
         </p:grpSp>
-        <mc:AlternateContent xmlns:mc="http://schemas.openxmlformats.org/markup-compatibility/2006">
-          <mc:Choice xmlns:a14="http://schemas.microsoft.com/office/drawing/2010/main" Requires="a14">
+        <mc:AlternateContent xmlns:mc="http://schemas.openxmlformats.org/markup-compatibility/2006" xmlns:a14="http://schemas.microsoft.com/office/drawing/2010/main">
+          <mc:Choice Requires="a14">
             <p:sp>
               <p:nvSpPr>
                 <p:cNvPr id="63" name="TextBox 62"/>
@@ -9445,7 +9446,7 @@
               </p:txBody>
             </p:sp>
           </mc:Choice>
-          <mc:Fallback>
+          <mc:Fallback xmlns="">
             <p:sp>
               <p:nvSpPr>
                 <p:cNvPr id="63" name="TextBox 62"/>
@@ -11567,8 +11568,8 @@
                 </a:extLst>
               </p:spPr>
             </p:cxnSp>
-            <mc:AlternateContent xmlns:mc="http://schemas.openxmlformats.org/markup-compatibility/2006">
-              <mc:Choice xmlns:a14="http://schemas.microsoft.com/office/drawing/2010/main" Requires="a14">
+            <mc:AlternateContent xmlns:mc="http://schemas.openxmlformats.org/markup-compatibility/2006" xmlns:a14="http://schemas.microsoft.com/office/drawing/2010/main">
+              <mc:Choice Requires="a14">
                 <p:sp>
                   <p:nvSpPr>
                     <p:cNvPr id="83" name="TextBox 82"/>
@@ -11630,7 +11631,7 @@
                   </p:txBody>
                 </p:sp>
               </mc:Choice>
-              <mc:Fallback>
+              <mc:Fallback xmlns="">
                 <p:sp>
                   <p:nvSpPr>
                     <p:cNvPr id="83" name="TextBox 82"/>
@@ -11669,8 +11670,8 @@
                 </p:sp>
               </mc:Fallback>
             </mc:AlternateContent>
-            <mc:AlternateContent xmlns:mc="http://schemas.openxmlformats.org/markup-compatibility/2006">
-              <mc:Choice xmlns:a14="http://schemas.microsoft.com/office/drawing/2010/main" Requires="a14">
+            <mc:AlternateContent xmlns:mc="http://schemas.openxmlformats.org/markup-compatibility/2006" xmlns:a14="http://schemas.microsoft.com/office/drawing/2010/main">
+              <mc:Choice Requires="a14">
                 <p:sp>
                   <p:nvSpPr>
                     <p:cNvPr id="84" name="TextBox 83"/>
@@ -11732,7 +11733,7 @@
                   </p:txBody>
                 </p:sp>
               </mc:Choice>
-              <mc:Fallback>
+              <mc:Fallback xmlns="">
                 <p:sp>
                   <p:nvSpPr>
                     <p:cNvPr id="84" name="TextBox 83"/>
@@ -11771,8 +11772,8 @@
                 </p:sp>
               </mc:Fallback>
             </mc:AlternateContent>
-            <mc:AlternateContent xmlns:mc="http://schemas.openxmlformats.org/markup-compatibility/2006">
-              <mc:Choice xmlns:a14="http://schemas.microsoft.com/office/drawing/2010/main" Requires="a14">
+            <mc:AlternateContent xmlns:mc="http://schemas.openxmlformats.org/markup-compatibility/2006" xmlns:a14="http://schemas.microsoft.com/office/drawing/2010/main">
+              <mc:Choice Requires="a14">
                 <p:sp>
                   <p:nvSpPr>
                     <p:cNvPr id="85" name="TextBox 84"/>
@@ -11834,7 +11835,7 @@
                   </p:txBody>
                 </p:sp>
               </mc:Choice>
-              <mc:Fallback>
+              <mc:Fallback xmlns="">
                 <p:sp>
                   <p:nvSpPr>
                     <p:cNvPr id="85" name="TextBox 84"/>
@@ -11873,8 +11874,8 @@
                 </p:sp>
               </mc:Fallback>
             </mc:AlternateContent>
-            <mc:AlternateContent xmlns:mc="http://schemas.openxmlformats.org/markup-compatibility/2006">
-              <mc:Choice xmlns:a14="http://schemas.microsoft.com/office/drawing/2010/main" Requires="a14">
+            <mc:AlternateContent xmlns:mc="http://schemas.openxmlformats.org/markup-compatibility/2006" xmlns:a14="http://schemas.microsoft.com/office/drawing/2010/main">
+              <mc:Choice Requires="a14">
                 <p:sp>
                   <p:nvSpPr>
                     <p:cNvPr id="86" name="TextBox 85"/>
@@ -11949,7 +11950,7 @@
                   </p:txBody>
                 </p:sp>
               </mc:Choice>
-              <mc:Fallback>
+              <mc:Fallback xmlns="">
                 <p:sp>
                   <p:nvSpPr>
                     <p:cNvPr id="86" name="TextBox 85"/>
@@ -11988,8 +11989,8 @@
                 </p:sp>
               </mc:Fallback>
             </mc:AlternateContent>
-            <mc:AlternateContent xmlns:mc="http://schemas.openxmlformats.org/markup-compatibility/2006">
-              <mc:Choice xmlns:a14="http://schemas.microsoft.com/office/drawing/2010/main" Requires="a14">
+            <mc:AlternateContent xmlns:mc="http://schemas.openxmlformats.org/markup-compatibility/2006" xmlns:a14="http://schemas.microsoft.com/office/drawing/2010/main">
+              <mc:Choice Requires="a14">
                 <p:sp>
                   <p:nvSpPr>
                     <p:cNvPr id="87" name="TextBox 86"/>
@@ -12064,7 +12065,7 @@
                   </p:txBody>
                 </p:sp>
               </mc:Choice>
-              <mc:Fallback>
+              <mc:Fallback xmlns="">
                 <p:sp>
                   <p:nvSpPr>
                     <p:cNvPr id="87" name="TextBox 86"/>
@@ -12103,8 +12104,8 @@
                 </p:sp>
               </mc:Fallback>
             </mc:AlternateContent>
-            <mc:AlternateContent xmlns:mc="http://schemas.openxmlformats.org/markup-compatibility/2006">
-              <mc:Choice xmlns:a14="http://schemas.microsoft.com/office/drawing/2010/main" Requires="a14">
+            <mc:AlternateContent xmlns:mc="http://schemas.openxmlformats.org/markup-compatibility/2006" xmlns:a14="http://schemas.microsoft.com/office/drawing/2010/main">
+              <mc:Choice Requires="a14">
                 <p:sp>
                   <p:nvSpPr>
                     <p:cNvPr id="88" name="TextBox 87"/>
@@ -12179,7 +12180,7 @@
                   </p:txBody>
                 </p:sp>
               </mc:Choice>
-              <mc:Fallback>
+              <mc:Fallback xmlns="">
                 <p:sp>
                   <p:nvSpPr>
                     <p:cNvPr id="88" name="TextBox 87"/>
@@ -12424,8 +12425,8 @@
             </mc:AlternateContent>
           </p:grpSp>
         </p:grpSp>
-        <mc:AlternateContent xmlns:mc="http://schemas.openxmlformats.org/markup-compatibility/2006">
-          <mc:Choice xmlns:a14="http://schemas.microsoft.com/office/drawing/2010/main" Requires="a14">
+        <mc:AlternateContent xmlns:mc="http://schemas.openxmlformats.org/markup-compatibility/2006" xmlns:a14="http://schemas.microsoft.com/office/drawing/2010/main">
+          <mc:Choice Requires="a14">
             <p:sp>
               <p:nvSpPr>
                 <p:cNvPr id="63" name="TextBox 62"/>
@@ -12469,7 +12470,7 @@
               </p:txBody>
             </p:sp>
           </mc:Choice>
-          <mc:Fallback>
+          <mc:Fallback xmlns="">
             <p:sp>
               <p:nvSpPr>
                 <p:cNvPr id="63" name="TextBox 62"/>
@@ -12508,8 +12509,8 @@
             </p:sp>
           </mc:Fallback>
         </mc:AlternateContent>
-        <mc:AlternateContent xmlns:mc="http://schemas.openxmlformats.org/markup-compatibility/2006">
-          <mc:Choice xmlns:a14="http://schemas.microsoft.com/office/drawing/2010/main" Requires="a14">
+        <mc:AlternateContent xmlns:mc="http://schemas.openxmlformats.org/markup-compatibility/2006" xmlns:a14="http://schemas.microsoft.com/office/drawing/2010/main">
+          <mc:Choice Requires="a14">
             <p:sp>
               <p:nvSpPr>
                 <p:cNvPr id="64" name="TextBox 63"/>
@@ -12596,7 +12597,7 @@
               </p:txBody>
             </p:sp>
           </mc:Choice>
-          <mc:Fallback>
+          <mc:Fallback xmlns="">
             <p:sp>
               <p:nvSpPr>
                 <p:cNvPr id="64" name="TextBox 63"/>
@@ -12737,8 +12738,8 @@
             </a:extLst>
           </p:spPr>
         </p:cxnSp>
-        <mc:AlternateContent xmlns:mc="http://schemas.openxmlformats.org/markup-compatibility/2006">
-          <mc:Choice xmlns:a14="http://schemas.microsoft.com/office/drawing/2010/main" Requires="a14">
+        <mc:AlternateContent xmlns:mc="http://schemas.openxmlformats.org/markup-compatibility/2006" xmlns:a14="http://schemas.microsoft.com/office/drawing/2010/main">
+          <mc:Choice Requires="a14">
             <p:sp>
               <p:nvSpPr>
                 <p:cNvPr id="74" name="TextBox 73"/>
@@ -12800,7 +12801,7 @@
               </p:txBody>
             </p:sp>
           </mc:Choice>
-          <mc:Fallback>
+          <mc:Fallback xmlns="">
             <p:sp>
               <p:nvSpPr>
                 <p:cNvPr id="74" name="TextBox 73"/>
@@ -12839,8 +12840,8 @@
             </p:sp>
           </mc:Fallback>
         </mc:AlternateContent>
-        <mc:AlternateContent xmlns:mc="http://schemas.openxmlformats.org/markup-compatibility/2006">
-          <mc:Choice xmlns:a14="http://schemas.microsoft.com/office/drawing/2010/main" Requires="a14">
+        <mc:AlternateContent xmlns:mc="http://schemas.openxmlformats.org/markup-compatibility/2006" xmlns:a14="http://schemas.microsoft.com/office/drawing/2010/main">
+          <mc:Choice Requires="a14">
             <p:sp>
               <p:nvSpPr>
                 <p:cNvPr id="75" name="TextBox 74"/>
@@ -12902,7 +12903,7 @@
               </p:txBody>
             </p:sp>
           </mc:Choice>
-          <mc:Fallback>
+          <mc:Fallback xmlns="">
             <p:sp>
               <p:nvSpPr>
                 <p:cNvPr id="75" name="TextBox 74"/>
@@ -12941,8 +12942,8 @@
             </p:sp>
           </mc:Fallback>
         </mc:AlternateContent>
-        <mc:AlternateContent xmlns:mc="http://schemas.openxmlformats.org/markup-compatibility/2006">
-          <mc:Choice xmlns:a14="http://schemas.microsoft.com/office/drawing/2010/main" Requires="a14">
+        <mc:AlternateContent xmlns:mc="http://schemas.openxmlformats.org/markup-compatibility/2006" xmlns:a14="http://schemas.microsoft.com/office/drawing/2010/main">
+          <mc:Choice Requires="a14">
             <p:sp>
               <p:nvSpPr>
                 <p:cNvPr id="76" name="TextBox 75"/>
@@ -13004,7 +13005,7 @@
               </p:txBody>
             </p:sp>
           </mc:Choice>
-          <mc:Fallback>
+          <mc:Fallback xmlns="">
             <p:sp>
               <p:nvSpPr>
                 <p:cNvPr id="76" name="TextBox 75"/>
@@ -13043,8 +13044,8 @@
             </p:sp>
           </mc:Fallback>
         </mc:AlternateContent>
-        <mc:AlternateContent xmlns:mc="http://schemas.openxmlformats.org/markup-compatibility/2006">
-          <mc:Choice xmlns:a14="http://schemas.microsoft.com/office/drawing/2010/main" Requires="a14">
+        <mc:AlternateContent xmlns:mc="http://schemas.openxmlformats.org/markup-compatibility/2006" xmlns:a14="http://schemas.microsoft.com/office/drawing/2010/main">
+          <mc:Choice Requires="a14">
             <p:sp>
               <p:nvSpPr>
                 <p:cNvPr id="77" name="TextBox 76"/>
@@ -13115,7 +13116,7 @@
               </p:txBody>
             </p:sp>
           </mc:Choice>
-          <mc:Fallback>
+          <mc:Fallback xmlns="">
             <p:sp>
               <p:nvSpPr>
                 <p:cNvPr id="77" name="TextBox 76"/>
@@ -13256,8 +13257,8 @@
             </a:extLst>
           </p:spPr>
         </p:cxnSp>
-        <mc:AlternateContent xmlns:mc="http://schemas.openxmlformats.org/markup-compatibility/2006">
-          <mc:Choice xmlns:a14="http://schemas.microsoft.com/office/drawing/2010/main" Requires="a14">
+        <mc:AlternateContent xmlns:mc="http://schemas.openxmlformats.org/markup-compatibility/2006" xmlns:a14="http://schemas.microsoft.com/office/drawing/2010/main">
+          <mc:Choice Requires="a14">
             <p:sp>
               <p:nvSpPr>
                 <p:cNvPr id="81" name="TextBox 80"/>
@@ -13319,7 +13320,7 @@
               </p:txBody>
             </p:sp>
           </mc:Choice>
-          <mc:Fallback>
+          <mc:Fallback xmlns="">
             <p:sp>
               <p:nvSpPr>
                 <p:cNvPr id="81" name="TextBox 80"/>
@@ -13358,8 +13359,8 @@
             </p:sp>
           </mc:Fallback>
         </mc:AlternateContent>
-        <mc:AlternateContent xmlns:mc="http://schemas.openxmlformats.org/markup-compatibility/2006">
-          <mc:Choice xmlns:a14="http://schemas.microsoft.com/office/drawing/2010/main" Requires="a14">
+        <mc:AlternateContent xmlns:mc="http://schemas.openxmlformats.org/markup-compatibility/2006" xmlns:a14="http://schemas.microsoft.com/office/drawing/2010/main">
+          <mc:Choice Requires="a14">
             <p:sp>
               <p:nvSpPr>
                 <p:cNvPr id="82" name="TextBox 81"/>
@@ -13421,7 +13422,7 @@
               </p:txBody>
             </p:sp>
           </mc:Choice>
-          <mc:Fallback>
+          <mc:Fallback xmlns="">
             <p:sp>
               <p:nvSpPr>
                 <p:cNvPr id="82" name="TextBox 81"/>
@@ -13460,8 +13461,8 @@
             </p:sp>
           </mc:Fallback>
         </mc:AlternateContent>
-        <mc:AlternateContent xmlns:mc="http://schemas.openxmlformats.org/markup-compatibility/2006">
-          <mc:Choice xmlns:a14="http://schemas.microsoft.com/office/drawing/2010/main" Requires="a14">
+        <mc:AlternateContent xmlns:mc="http://schemas.openxmlformats.org/markup-compatibility/2006" xmlns:a14="http://schemas.microsoft.com/office/drawing/2010/main">
+          <mc:Choice Requires="a14">
             <p:sp>
               <p:nvSpPr>
                 <p:cNvPr id="95" name="TextBox 94"/>
@@ -13523,7 +13524,7 @@
               </p:txBody>
             </p:sp>
           </mc:Choice>
-          <mc:Fallback>
+          <mc:Fallback xmlns="">
             <p:sp>
               <p:nvSpPr>
                 <p:cNvPr id="95" name="TextBox 94"/>
@@ -13562,8 +13563,8 @@
             </p:sp>
           </mc:Fallback>
         </mc:AlternateContent>
-        <mc:AlternateContent xmlns:mc="http://schemas.openxmlformats.org/markup-compatibility/2006">
-          <mc:Choice xmlns:a14="http://schemas.microsoft.com/office/drawing/2010/main" Requires="a14">
+        <mc:AlternateContent xmlns:mc="http://schemas.openxmlformats.org/markup-compatibility/2006" xmlns:a14="http://schemas.microsoft.com/office/drawing/2010/main">
+          <mc:Choice Requires="a14">
             <p:sp>
               <p:nvSpPr>
                 <p:cNvPr id="96" name="TextBox 95"/>
@@ -13634,7 +13635,7 @@
               </p:txBody>
             </p:sp>
           </mc:Choice>
-          <mc:Fallback>
+          <mc:Fallback xmlns="">
             <p:sp>
               <p:nvSpPr>
                 <p:cNvPr id="96" name="TextBox 95"/>
@@ -13775,8 +13776,8 @@
             </a:extLst>
           </p:spPr>
         </p:cxnSp>
-        <mc:AlternateContent xmlns:mc="http://schemas.openxmlformats.org/markup-compatibility/2006">
-          <mc:Choice xmlns:a14="http://schemas.microsoft.com/office/drawing/2010/main" Requires="a14">
+        <mc:AlternateContent xmlns:mc="http://schemas.openxmlformats.org/markup-compatibility/2006" xmlns:a14="http://schemas.microsoft.com/office/drawing/2010/main">
+          <mc:Choice Requires="a14">
             <p:sp>
               <p:nvSpPr>
                 <p:cNvPr id="100" name="TextBox 99"/>
@@ -13838,7 +13839,7 @@
               </p:txBody>
             </p:sp>
           </mc:Choice>
-          <mc:Fallback>
+          <mc:Fallback xmlns="">
             <p:sp>
               <p:nvSpPr>
                 <p:cNvPr id="100" name="TextBox 99"/>
@@ -13877,8 +13878,8 @@
             </p:sp>
           </mc:Fallback>
         </mc:AlternateContent>
-        <mc:AlternateContent xmlns:mc="http://schemas.openxmlformats.org/markup-compatibility/2006">
-          <mc:Choice xmlns:a14="http://schemas.microsoft.com/office/drawing/2010/main" Requires="a14">
+        <mc:AlternateContent xmlns:mc="http://schemas.openxmlformats.org/markup-compatibility/2006" xmlns:a14="http://schemas.microsoft.com/office/drawing/2010/main">
+          <mc:Choice Requires="a14">
             <p:sp>
               <p:nvSpPr>
                 <p:cNvPr id="101" name="TextBox 100"/>
@@ -13940,7 +13941,7 @@
               </p:txBody>
             </p:sp>
           </mc:Choice>
-          <mc:Fallback>
+          <mc:Fallback xmlns="">
             <p:sp>
               <p:nvSpPr>
                 <p:cNvPr id="101" name="TextBox 100"/>
@@ -13979,8 +13980,8 @@
             </p:sp>
           </mc:Fallback>
         </mc:AlternateContent>
-        <mc:AlternateContent xmlns:mc="http://schemas.openxmlformats.org/markup-compatibility/2006">
-          <mc:Choice xmlns:a14="http://schemas.microsoft.com/office/drawing/2010/main" Requires="a14">
+        <mc:AlternateContent xmlns:mc="http://schemas.openxmlformats.org/markup-compatibility/2006" xmlns:a14="http://schemas.microsoft.com/office/drawing/2010/main">
+          <mc:Choice Requires="a14">
             <p:sp>
               <p:nvSpPr>
                 <p:cNvPr id="102" name="TextBox 101"/>
@@ -14042,7 +14043,7 @@
               </p:txBody>
             </p:sp>
           </mc:Choice>
-          <mc:Fallback>
+          <mc:Fallback xmlns="">
             <p:sp>
               <p:nvSpPr>
                 <p:cNvPr id="102" name="TextBox 101"/>
@@ -14081,8 +14082,8 @@
             </p:sp>
           </mc:Fallback>
         </mc:AlternateContent>
-        <mc:AlternateContent xmlns:mc="http://schemas.openxmlformats.org/markup-compatibility/2006">
-          <mc:Choice xmlns:a14="http://schemas.microsoft.com/office/drawing/2010/main" Requires="a14">
+        <mc:AlternateContent xmlns:mc="http://schemas.openxmlformats.org/markup-compatibility/2006" xmlns:a14="http://schemas.microsoft.com/office/drawing/2010/main">
+          <mc:Choice Requires="a14">
             <p:sp>
               <p:nvSpPr>
                 <p:cNvPr id="103" name="TextBox 102"/>
@@ -14153,7 +14154,7 @@
               </p:txBody>
             </p:sp>
           </mc:Choice>
-          <mc:Fallback>
+          <mc:Fallback xmlns="">
             <p:sp>
               <p:nvSpPr>
                 <p:cNvPr id="103" name="TextBox 102"/>
@@ -14294,8 +14295,8 @@
             </a:extLst>
           </p:spPr>
         </p:cxnSp>
-        <mc:AlternateContent xmlns:mc="http://schemas.openxmlformats.org/markup-compatibility/2006">
-          <mc:Choice xmlns:a14="http://schemas.microsoft.com/office/drawing/2010/main" Requires="a14">
+        <mc:AlternateContent xmlns:mc="http://schemas.openxmlformats.org/markup-compatibility/2006" xmlns:a14="http://schemas.microsoft.com/office/drawing/2010/main">
+          <mc:Choice Requires="a14">
             <p:sp>
               <p:nvSpPr>
                 <p:cNvPr id="107" name="TextBox 106"/>
@@ -14357,7 +14358,7 @@
               </p:txBody>
             </p:sp>
           </mc:Choice>
-          <mc:Fallback>
+          <mc:Fallback xmlns="">
             <p:sp>
               <p:nvSpPr>
                 <p:cNvPr id="107" name="TextBox 106"/>
@@ -14446,8 +14447,8 @@
             </a:p>
           </p:txBody>
         </p:sp>
-        <mc:AlternateContent xmlns:mc="http://schemas.openxmlformats.org/markup-compatibility/2006">
-          <mc:Choice xmlns:a14="http://schemas.microsoft.com/office/drawing/2010/main" Requires="a14">
+        <mc:AlternateContent xmlns:mc="http://schemas.openxmlformats.org/markup-compatibility/2006" xmlns:a14="http://schemas.microsoft.com/office/drawing/2010/main">
+          <mc:Choice Requires="a14">
             <p:sp>
               <p:nvSpPr>
                 <p:cNvPr id="109" name="TextBox 108"/>
@@ -14509,7 +14510,7 @@
               </p:txBody>
             </p:sp>
           </mc:Choice>
-          <mc:Fallback>
+          <mc:Fallback xmlns="">
             <p:sp>
               <p:nvSpPr>
                 <p:cNvPr id="109" name="TextBox 108"/>
@@ -14548,8 +14549,8 @@
             </p:sp>
           </mc:Fallback>
         </mc:AlternateContent>
-        <mc:AlternateContent xmlns:mc="http://schemas.openxmlformats.org/markup-compatibility/2006">
-          <mc:Choice xmlns:a14="http://schemas.microsoft.com/office/drawing/2010/main" Requires="a14">
+        <mc:AlternateContent xmlns:mc="http://schemas.openxmlformats.org/markup-compatibility/2006" xmlns:a14="http://schemas.microsoft.com/office/drawing/2010/main">
+          <mc:Choice Requires="a14">
             <p:sp>
               <p:nvSpPr>
                 <p:cNvPr id="110" name="TextBox 109"/>
@@ -14611,7 +14612,7 @@
               </p:txBody>
             </p:sp>
           </mc:Choice>
-          <mc:Fallback>
+          <mc:Fallback xmlns="">
             <p:sp>
               <p:nvSpPr>
                 <p:cNvPr id="110" name="TextBox 109"/>
@@ -14650,8 +14651,8 @@
             </p:sp>
           </mc:Fallback>
         </mc:AlternateContent>
-        <mc:AlternateContent xmlns:mc="http://schemas.openxmlformats.org/markup-compatibility/2006">
-          <mc:Choice xmlns:a14="http://schemas.microsoft.com/office/drawing/2010/main" Requires="a14">
+        <mc:AlternateContent xmlns:mc="http://schemas.openxmlformats.org/markup-compatibility/2006" xmlns:a14="http://schemas.microsoft.com/office/drawing/2010/main">
+          <mc:Choice Requires="a14">
             <p:sp>
               <p:nvSpPr>
                 <p:cNvPr id="111" name="TextBox 110"/>
@@ -14722,7 +14723,7 @@
               </p:txBody>
             </p:sp>
           </mc:Choice>
-          <mc:Fallback>
+          <mc:Fallback xmlns="">
             <p:sp>
               <p:nvSpPr>
                 <p:cNvPr id="111" name="TextBox 110"/>
@@ -14863,8 +14864,8 @@
             </a:extLst>
           </p:spPr>
         </p:cxnSp>
-        <mc:AlternateContent xmlns:mc="http://schemas.openxmlformats.org/markup-compatibility/2006">
-          <mc:Choice xmlns:a14="http://schemas.microsoft.com/office/drawing/2010/main" Requires="a14">
+        <mc:AlternateContent xmlns:mc="http://schemas.openxmlformats.org/markup-compatibility/2006" xmlns:a14="http://schemas.microsoft.com/office/drawing/2010/main">
+          <mc:Choice Requires="a14">
             <p:sp>
               <p:nvSpPr>
                 <p:cNvPr id="115" name="TextBox 114"/>
@@ -14926,7 +14927,7 @@
               </p:txBody>
             </p:sp>
           </mc:Choice>
-          <mc:Fallback>
+          <mc:Fallback xmlns="">
             <p:sp>
               <p:nvSpPr>
                 <p:cNvPr id="115" name="TextBox 114"/>
@@ -14965,8 +14966,8 @@
             </p:sp>
           </mc:Fallback>
         </mc:AlternateContent>
-        <mc:AlternateContent xmlns:mc="http://schemas.openxmlformats.org/markup-compatibility/2006">
-          <mc:Choice xmlns:a14="http://schemas.microsoft.com/office/drawing/2010/main" Requires="a14">
+        <mc:AlternateContent xmlns:mc="http://schemas.openxmlformats.org/markup-compatibility/2006" xmlns:a14="http://schemas.microsoft.com/office/drawing/2010/main">
+          <mc:Choice Requires="a14">
             <p:sp>
               <p:nvSpPr>
                 <p:cNvPr id="116" name="TextBox 115"/>
@@ -15028,7 +15029,7 @@
               </p:txBody>
             </p:sp>
           </mc:Choice>
-          <mc:Fallback>
+          <mc:Fallback xmlns="">
             <p:sp>
               <p:nvSpPr>
                 <p:cNvPr id="116" name="TextBox 115"/>
@@ -15067,8 +15068,8 @@
             </p:sp>
           </mc:Fallback>
         </mc:AlternateContent>
-        <mc:AlternateContent xmlns:mc="http://schemas.openxmlformats.org/markup-compatibility/2006">
-          <mc:Choice xmlns:a14="http://schemas.microsoft.com/office/drawing/2010/main" Requires="a14">
+        <mc:AlternateContent xmlns:mc="http://schemas.openxmlformats.org/markup-compatibility/2006" xmlns:a14="http://schemas.microsoft.com/office/drawing/2010/main">
+          <mc:Choice Requires="a14">
             <p:sp>
               <p:nvSpPr>
                 <p:cNvPr id="117" name="TextBox 116"/>
@@ -15130,7 +15131,7 @@
               </p:txBody>
             </p:sp>
           </mc:Choice>
-          <mc:Fallback>
+          <mc:Fallback xmlns="">
             <p:sp>
               <p:nvSpPr>
                 <p:cNvPr id="117" name="TextBox 116"/>
@@ -15169,8 +15170,8 @@
             </p:sp>
           </mc:Fallback>
         </mc:AlternateContent>
-        <mc:AlternateContent xmlns:mc="http://schemas.openxmlformats.org/markup-compatibility/2006">
-          <mc:Choice xmlns:a14="http://schemas.microsoft.com/office/drawing/2010/main" Requires="a14">
+        <mc:AlternateContent xmlns:mc="http://schemas.openxmlformats.org/markup-compatibility/2006" xmlns:a14="http://schemas.microsoft.com/office/drawing/2010/main">
+          <mc:Choice Requires="a14">
             <p:sp>
               <p:nvSpPr>
                 <p:cNvPr id="119" name="TextBox 118"/>
@@ -15241,7 +15242,7 @@
               </p:txBody>
             </p:sp>
           </mc:Choice>
-          <mc:Fallback>
+          <mc:Fallback xmlns="">
             <p:sp>
               <p:nvSpPr>
                 <p:cNvPr id="119" name="TextBox 118"/>
@@ -15395,8 +15396,8 @@
                       <a:chExt cx="5319533" cy="4229492"/>
                     </a:xfrm>
                   </p:grpSpPr>
-                  <mc:AlternateContent xmlns:mc="http://schemas.openxmlformats.org/markup-compatibility/2006">
-                    <mc:Choice xmlns:a14="http://schemas.microsoft.com/office/drawing/2010/main" Requires="a14">
+                  <mc:AlternateContent xmlns:mc="http://schemas.openxmlformats.org/markup-compatibility/2006" xmlns:a14="http://schemas.microsoft.com/office/drawing/2010/main">
+                    <mc:Choice Requires="a14">
                       <p:sp>
                         <p:nvSpPr>
                           <p:cNvPr id="91" name="TextBox 90"/>
@@ -15458,7 +15459,7 @@
                         </p:txBody>
                       </p:sp>
                     </mc:Choice>
-                    <mc:Fallback>
+                    <mc:Fallback xmlns="">
                       <p:sp>
                         <p:nvSpPr>
                           <p:cNvPr id="91" name="TextBox 90"/>
@@ -17317,8 +17318,8 @@
                         </a:extLst>
                       </p:spPr>
                     </p:cxnSp>
-                    <mc:AlternateContent xmlns:mc="http://schemas.openxmlformats.org/markup-compatibility/2006">
-                      <mc:Choice xmlns:a14="http://schemas.microsoft.com/office/drawing/2010/main" Requires="a14">
+                    <mc:AlternateContent xmlns:mc="http://schemas.openxmlformats.org/markup-compatibility/2006" xmlns:a14="http://schemas.microsoft.com/office/drawing/2010/main">
+                      <mc:Choice Requires="a14">
                         <p:sp>
                           <p:nvSpPr>
                             <p:cNvPr id="83" name="TextBox 82"/>
@@ -17380,7 +17381,7 @@
                           </p:txBody>
                         </p:sp>
                       </mc:Choice>
-                      <mc:Fallback>
+                      <mc:Fallback xmlns="">
                         <p:sp>
                           <p:nvSpPr>
                             <p:cNvPr id="83" name="TextBox 82"/>
@@ -17419,8 +17420,8 @@
                         </p:sp>
                       </mc:Fallback>
                     </mc:AlternateContent>
-                    <mc:AlternateContent xmlns:mc="http://schemas.openxmlformats.org/markup-compatibility/2006">
-                      <mc:Choice xmlns:a14="http://schemas.microsoft.com/office/drawing/2010/main" Requires="a14">
+                    <mc:AlternateContent xmlns:mc="http://schemas.openxmlformats.org/markup-compatibility/2006" xmlns:a14="http://schemas.microsoft.com/office/drawing/2010/main">
+                      <mc:Choice Requires="a14">
                         <p:sp>
                           <p:nvSpPr>
                             <p:cNvPr id="84" name="TextBox 83"/>
@@ -17482,7 +17483,7 @@
                           </p:txBody>
                         </p:sp>
                       </mc:Choice>
-                      <mc:Fallback>
+                      <mc:Fallback xmlns="">
                         <p:sp>
                           <p:nvSpPr>
                             <p:cNvPr id="84" name="TextBox 83"/>
@@ -17521,8 +17522,8 @@
                         </p:sp>
                       </mc:Fallback>
                     </mc:AlternateContent>
-                    <mc:AlternateContent xmlns:mc="http://schemas.openxmlformats.org/markup-compatibility/2006">
-                      <mc:Choice xmlns:a14="http://schemas.microsoft.com/office/drawing/2010/main" Requires="a14">
+                    <mc:AlternateContent xmlns:mc="http://schemas.openxmlformats.org/markup-compatibility/2006" xmlns:a14="http://schemas.microsoft.com/office/drawing/2010/main">
+                      <mc:Choice Requires="a14">
                         <p:sp>
                           <p:nvSpPr>
                             <p:cNvPr id="85" name="TextBox 84"/>
@@ -17584,7 +17585,7 @@
                           </p:txBody>
                         </p:sp>
                       </mc:Choice>
-                      <mc:Fallback>
+                      <mc:Fallback xmlns="">
                         <p:sp>
                           <p:nvSpPr>
                             <p:cNvPr id="85" name="TextBox 84"/>
@@ -17623,8 +17624,8 @@
                         </p:sp>
                       </mc:Fallback>
                     </mc:AlternateContent>
-                    <mc:AlternateContent xmlns:mc="http://schemas.openxmlformats.org/markup-compatibility/2006">
-                      <mc:Choice xmlns:a14="http://schemas.microsoft.com/office/drawing/2010/main" Requires="a14">
+                    <mc:AlternateContent xmlns:mc="http://schemas.openxmlformats.org/markup-compatibility/2006" xmlns:a14="http://schemas.microsoft.com/office/drawing/2010/main">
+                      <mc:Choice Requires="a14">
                         <p:sp>
                           <p:nvSpPr>
                             <p:cNvPr id="86" name="TextBox 85"/>
@@ -17699,7 +17700,7 @@
                           </p:txBody>
                         </p:sp>
                       </mc:Choice>
-                      <mc:Fallback>
+                      <mc:Fallback xmlns="">
                         <p:sp>
                           <p:nvSpPr>
                             <p:cNvPr id="86" name="TextBox 85"/>
@@ -17738,8 +17739,8 @@
                         </p:sp>
                       </mc:Fallback>
                     </mc:AlternateContent>
-                    <mc:AlternateContent xmlns:mc="http://schemas.openxmlformats.org/markup-compatibility/2006">
-                      <mc:Choice xmlns:a14="http://schemas.microsoft.com/office/drawing/2010/main" Requires="a14">
+                    <mc:AlternateContent xmlns:mc="http://schemas.openxmlformats.org/markup-compatibility/2006" xmlns:a14="http://schemas.microsoft.com/office/drawing/2010/main">
+                      <mc:Choice Requires="a14">
                         <p:sp>
                           <p:nvSpPr>
                             <p:cNvPr id="87" name="TextBox 86"/>
@@ -17814,7 +17815,7 @@
                           </p:txBody>
                         </p:sp>
                       </mc:Choice>
-                      <mc:Fallback>
+                      <mc:Fallback xmlns="">
                         <p:sp>
                           <p:nvSpPr>
                             <p:cNvPr id="87" name="TextBox 86"/>
@@ -17853,8 +17854,8 @@
                         </p:sp>
                       </mc:Fallback>
                     </mc:AlternateContent>
-                    <mc:AlternateContent xmlns:mc="http://schemas.openxmlformats.org/markup-compatibility/2006">
-                      <mc:Choice xmlns:a14="http://schemas.microsoft.com/office/drawing/2010/main" Requires="a14">
+                    <mc:AlternateContent xmlns:mc="http://schemas.openxmlformats.org/markup-compatibility/2006" xmlns:a14="http://schemas.microsoft.com/office/drawing/2010/main">
+                      <mc:Choice Requires="a14">
                         <p:sp>
                           <p:nvSpPr>
                             <p:cNvPr id="88" name="TextBox 87"/>
@@ -17929,7 +17930,7 @@
                           </p:txBody>
                         </p:sp>
                       </mc:Choice>
-                      <mc:Fallback>
+                      <mc:Fallback xmlns="">
                         <p:sp>
                           <p:nvSpPr>
                             <p:cNvPr id="88" name="TextBox 87"/>
@@ -17968,8 +17969,8 @@
                         </p:sp>
                       </mc:Fallback>
                     </mc:AlternateContent>
-                    <mc:AlternateContent xmlns:mc="http://schemas.openxmlformats.org/markup-compatibility/2006">
-                      <mc:Choice xmlns:a14="http://schemas.microsoft.com/office/drawing/2010/main" Requires="a14">
+                    <mc:AlternateContent xmlns:mc="http://schemas.openxmlformats.org/markup-compatibility/2006" xmlns:a14="http://schemas.microsoft.com/office/drawing/2010/main">
+                      <mc:Choice Requires="a14">
                         <p:sp>
                           <p:nvSpPr>
                             <p:cNvPr id="89" name="TextBox 88"/>
@@ -18031,7 +18032,7 @@
                           </p:txBody>
                         </p:sp>
                       </mc:Choice>
-                      <mc:Fallback>
+                      <mc:Fallback xmlns="">
                         <p:sp>
                           <p:nvSpPr>
                             <p:cNvPr id="89" name="TextBox 88"/>
@@ -18070,8 +18071,8 @@
                         </p:sp>
                       </mc:Fallback>
                     </mc:AlternateContent>
-                    <mc:AlternateContent xmlns:mc="http://schemas.openxmlformats.org/markup-compatibility/2006">
-                      <mc:Choice xmlns:a14="http://schemas.microsoft.com/office/drawing/2010/main" Requires="a14">
+                    <mc:AlternateContent xmlns:mc="http://schemas.openxmlformats.org/markup-compatibility/2006" xmlns:a14="http://schemas.microsoft.com/office/drawing/2010/main">
+                      <mc:Choice Requires="a14">
                         <p:sp>
                           <p:nvSpPr>
                             <p:cNvPr id="90" name="TextBox 89"/>
@@ -18133,7 +18134,7 @@
                           </p:txBody>
                         </p:sp>
                       </mc:Choice>
-                      <mc:Fallback>
+                      <mc:Fallback xmlns="">
                         <p:sp>
                           <p:nvSpPr>
                             <p:cNvPr id="90" name="TextBox 89"/>
@@ -18174,8 +18175,8 @@
                     </mc:AlternateContent>
                   </p:grpSp>
                 </p:grpSp>
-                <mc:AlternateContent xmlns:mc="http://schemas.openxmlformats.org/markup-compatibility/2006">
-                  <mc:Choice xmlns:a14="http://schemas.microsoft.com/office/drawing/2010/main" Requires="a14">
+                <mc:AlternateContent xmlns:mc="http://schemas.openxmlformats.org/markup-compatibility/2006" xmlns:a14="http://schemas.microsoft.com/office/drawing/2010/main">
+                  <mc:Choice Requires="a14">
                     <p:sp>
                       <p:nvSpPr>
                         <p:cNvPr id="63" name="TextBox 62"/>
@@ -18219,7 +18220,7 @@
                       </p:txBody>
                     </p:sp>
                   </mc:Choice>
-                  <mc:Fallback>
+                  <mc:Fallback xmlns="">
                     <p:sp>
                       <p:nvSpPr>
                         <p:cNvPr id="63" name="TextBox 62"/>
@@ -18258,8 +18259,8 @@
                     </p:sp>
                   </mc:Fallback>
                 </mc:AlternateContent>
-                <mc:AlternateContent xmlns:mc="http://schemas.openxmlformats.org/markup-compatibility/2006">
-                  <mc:Choice xmlns:a14="http://schemas.microsoft.com/office/drawing/2010/main" Requires="a14">
+                <mc:AlternateContent xmlns:mc="http://schemas.openxmlformats.org/markup-compatibility/2006" xmlns:a14="http://schemas.microsoft.com/office/drawing/2010/main">
+                  <mc:Choice Requires="a14">
                     <p:sp>
                       <p:nvSpPr>
                         <p:cNvPr id="64" name="TextBox 63"/>
@@ -18346,7 +18347,7 @@
                       </p:txBody>
                     </p:sp>
                   </mc:Choice>
-                  <mc:Fallback>
+                  <mc:Fallback xmlns="">
                     <p:sp>
                       <p:nvSpPr>
                         <p:cNvPr id="64" name="TextBox 63"/>
@@ -18385,8 +18386,8 @@
                     </p:sp>
                   </mc:Fallback>
                 </mc:AlternateContent>
-                <mc:AlternateContent xmlns:mc="http://schemas.openxmlformats.org/markup-compatibility/2006">
-                  <mc:Choice xmlns:a14="http://schemas.microsoft.com/office/drawing/2010/main" Requires="a14">
+                <mc:AlternateContent xmlns:mc="http://schemas.openxmlformats.org/markup-compatibility/2006" xmlns:a14="http://schemas.microsoft.com/office/drawing/2010/main">
+                  <mc:Choice Requires="a14">
                     <p:sp>
                       <p:nvSpPr>
                         <p:cNvPr id="77" name="TextBox 76"/>
@@ -18457,7 +18458,7 @@
                       </p:txBody>
                     </p:sp>
                   </mc:Choice>
-                  <mc:Fallback>
+                  <mc:Fallback xmlns="">
                     <p:sp>
                       <p:nvSpPr>
                         <p:cNvPr id="77" name="TextBox 76"/>
@@ -18496,8 +18497,8 @@
                     </p:sp>
                   </mc:Fallback>
                 </mc:AlternateContent>
-                <mc:AlternateContent xmlns:mc="http://schemas.openxmlformats.org/markup-compatibility/2006">
-                  <mc:Choice xmlns:a14="http://schemas.microsoft.com/office/drawing/2010/main" Requires="a14">
+                <mc:AlternateContent xmlns:mc="http://schemas.openxmlformats.org/markup-compatibility/2006" xmlns:a14="http://schemas.microsoft.com/office/drawing/2010/main">
+                  <mc:Choice Requires="a14">
                     <p:sp>
                       <p:nvSpPr>
                         <p:cNvPr id="81" name="TextBox 80"/>
@@ -18559,7 +18560,7 @@
                       </p:txBody>
                     </p:sp>
                   </mc:Choice>
-                  <mc:Fallback>
+                  <mc:Fallback xmlns="">
                     <p:sp>
                       <p:nvSpPr>
                         <p:cNvPr id="81" name="TextBox 80"/>
@@ -18598,8 +18599,8 @@
                     </p:sp>
                   </mc:Fallback>
                 </mc:AlternateContent>
-                <mc:AlternateContent xmlns:mc="http://schemas.openxmlformats.org/markup-compatibility/2006">
-                  <mc:Choice xmlns:a14="http://schemas.microsoft.com/office/drawing/2010/main" Requires="a14">
+                <mc:AlternateContent xmlns:mc="http://schemas.openxmlformats.org/markup-compatibility/2006" xmlns:a14="http://schemas.microsoft.com/office/drawing/2010/main">
+                  <mc:Choice Requires="a14">
                     <p:sp>
                       <p:nvSpPr>
                         <p:cNvPr id="82" name="TextBox 81"/>
@@ -18661,7 +18662,7 @@
                       </p:txBody>
                     </p:sp>
                   </mc:Choice>
-                  <mc:Fallback>
+                  <mc:Fallback xmlns="">
                     <p:sp>
                       <p:nvSpPr>
                         <p:cNvPr id="82" name="TextBox 81"/>
@@ -18700,8 +18701,8 @@
                     </p:sp>
                   </mc:Fallback>
                 </mc:AlternateContent>
-                <mc:AlternateContent xmlns:mc="http://schemas.openxmlformats.org/markup-compatibility/2006">
-                  <mc:Choice xmlns:a14="http://schemas.microsoft.com/office/drawing/2010/main" Requires="a14">
+                <mc:AlternateContent xmlns:mc="http://schemas.openxmlformats.org/markup-compatibility/2006" xmlns:a14="http://schemas.microsoft.com/office/drawing/2010/main">
+                  <mc:Choice Requires="a14">
                     <p:sp>
                       <p:nvSpPr>
                         <p:cNvPr id="95" name="TextBox 94"/>
@@ -18763,7 +18764,7 @@
                       </p:txBody>
                     </p:sp>
                   </mc:Choice>
-                  <mc:Fallback>
+                  <mc:Fallback xmlns="">
                     <p:sp>
                       <p:nvSpPr>
                         <p:cNvPr id="95" name="TextBox 94"/>
@@ -18802,8 +18803,8 @@
                     </p:sp>
                   </mc:Fallback>
                 </mc:AlternateContent>
-                <mc:AlternateContent xmlns:mc="http://schemas.openxmlformats.org/markup-compatibility/2006">
-                  <mc:Choice xmlns:a14="http://schemas.microsoft.com/office/drawing/2010/main" Requires="a14">
+                <mc:AlternateContent xmlns:mc="http://schemas.openxmlformats.org/markup-compatibility/2006" xmlns:a14="http://schemas.microsoft.com/office/drawing/2010/main">
+                  <mc:Choice Requires="a14">
                     <p:sp>
                       <p:nvSpPr>
                         <p:cNvPr id="96" name="TextBox 95"/>
@@ -18874,7 +18875,7 @@
                       </p:txBody>
                     </p:sp>
                   </mc:Choice>
-                  <mc:Fallback>
+                  <mc:Fallback xmlns="">
                     <p:sp>
                       <p:nvSpPr>
                         <p:cNvPr id="96" name="TextBox 95"/>
@@ -18913,8 +18914,8 @@
                     </p:sp>
                   </mc:Fallback>
                 </mc:AlternateContent>
-                <mc:AlternateContent xmlns:mc="http://schemas.openxmlformats.org/markup-compatibility/2006">
-                  <mc:Choice xmlns:a14="http://schemas.microsoft.com/office/drawing/2010/main" Requires="a14">
+                <mc:AlternateContent xmlns:mc="http://schemas.openxmlformats.org/markup-compatibility/2006" xmlns:a14="http://schemas.microsoft.com/office/drawing/2010/main">
+                  <mc:Choice Requires="a14">
                     <p:sp>
                       <p:nvSpPr>
                         <p:cNvPr id="100" name="TextBox 99"/>
@@ -18976,7 +18977,7 @@
                       </p:txBody>
                     </p:sp>
                   </mc:Choice>
-                  <mc:Fallback>
+                  <mc:Fallback xmlns="">
                     <p:sp>
                       <p:nvSpPr>
                         <p:cNvPr id="100" name="TextBox 99"/>
@@ -19015,8 +19016,8 @@
                     </p:sp>
                   </mc:Fallback>
                 </mc:AlternateContent>
-                <mc:AlternateContent xmlns:mc="http://schemas.openxmlformats.org/markup-compatibility/2006">
-                  <mc:Choice xmlns:a14="http://schemas.microsoft.com/office/drawing/2010/main" Requires="a14">
+                <mc:AlternateContent xmlns:mc="http://schemas.openxmlformats.org/markup-compatibility/2006" xmlns:a14="http://schemas.microsoft.com/office/drawing/2010/main">
+                  <mc:Choice Requires="a14">
                     <p:sp>
                       <p:nvSpPr>
                         <p:cNvPr id="101" name="TextBox 100"/>
@@ -19078,7 +19079,7 @@
                       </p:txBody>
                     </p:sp>
                   </mc:Choice>
-                  <mc:Fallback>
+                  <mc:Fallback xmlns="">
                     <p:sp>
                       <p:nvSpPr>
                         <p:cNvPr id="101" name="TextBox 100"/>
@@ -19117,8 +19118,8 @@
                     </p:sp>
                   </mc:Fallback>
                 </mc:AlternateContent>
-                <mc:AlternateContent xmlns:mc="http://schemas.openxmlformats.org/markup-compatibility/2006">
-                  <mc:Choice xmlns:a14="http://schemas.microsoft.com/office/drawing/2010/main" Requires="a14">
+                <mc:AlternateContent xmlns:mc="http://schemas.openxmlformats.org/markup-compatibility/2006" xmlns:a14="http://schemas.microsoft.com/office/drawing/2010/main">
+                  <mc:Choice Requires="a14">
                     <p:sp>
                       <p:nvSpPr>
                         <p:cNvPr id="102" name="TextBox 101"/>
@@ -19180,7 +19181,7 @@
                       </p:txBody>
                     </p:sp>
                   </mc:Choice>
-                  <mc:Fallback>
+                  <mc:Fallback xmlns="">
                     <p:sp>
                       <p:nvSpPr>
                         <p:cNvPr id="102" name="TextBox 101"/>
@@ -19219,8 +19220,8 @@
                     </p:sp>
                   </mc:Fallback>
                 </mc:AlternateContent>
-                <mc:AlternateContent xmlns:mc="http://schemas.openxmlformats.org/markup-compatibility/2006">
-                  <mc:Choice xmlns:a14="http://schemas.microsoft.com/office/drawing/2010/main" Requires="a14">
+                <mc:AlternateContent xmlns:mc="http://schemas.openxmlformats.org/markup-compatibility/2006" xmlns:a14="http://schemas.microsoft.com/office/drawing/2010/main">
+                  <mc:Choice Requires="a14">
                     <p:sp>
                       <p:nvSpPr>
                         <p:cNvPr id="103" name="TextBox 102"/>
@@ -19291,7 +19292,7 @@
                       </p:txBody>
                     </p:sp>
                   </mc:Choice>
-                  <mc:Fallback>
+                  <mc:Fallback xmlns="">
                     <p:sp>
                       <p:nvSpPr>
                         <p:cNvPr id="103" name="TextBox 102"/>
@@ -19330,8 +19331,8 @@
                     </p:sp>
                   </mc:Fallback>
                 </mc:AlternateContent>
-                <mc:AlternateContent xmlns:mc="http://schemas.openxmlformats.org/markup-compatibility/2006">
-                  <mc:Choice xmlns:a14="http://schemas.microsoft.com/office/drawing/2010/main" Requires="a14">
+                <mc:AlternateContent xmlns:mc="http://schemas.openxmlformats.org/markup-compatibility/2006" xmlns:a14="http://schemas.microsoft.com/office/drawing/2010/main">
+                  <mc:Choice Requires="a14">
                     <p:sp>
                       <p:nvSpPr>
                         <p:cNvPr id="107" name="TextBox 106"/>
@@ -19393,7 +19394,7 @@
                       </p:txBody>
                     </p:sp>
                   </mc:Choice>
-                  <mc:Fallback>
+                  <mc:Fallback xmlns="">
                     <p:sp>
                       <p:nvSpPr>
                         <p:cNvPr id="107" name="TextBox 106"/>
@@ -19432,8 +19433,8 @@
                     </p:sp>
                   </mc:Fallback>
                 </mc:AlternateContent>
-                <mc:AlternateContent xmlns:mc="http://schemas.openxmlformats.org/markup-compatibility/2006">
-                  <mc:Choice xmlns:a14="http://schemas.microsoft.com/office/drawing/2010/main" Requires="a14">
+                <mc:AlternateContent xmlns:mc="http://schemas.openxmlformats.org/markup-compatibility/2006" xmlns:a14="http://schemas.microsoft.com/office/drawing/2010/main">
+                  <mc:Choice Requires="a14">
                     <p:sp>
                       <p:nvSpPr>
                         <p:cNvPr id="109" name="TextBox 108"/>
@@ -19495,7 +19496,7 @@
                       </p:txBody>
                     </p:sp>
                   </mc:Choice>
-                  <mc:Fallback>
+                  <mc:Fallback xmlns="">
                     <p:sp>
                       <p:nvSpPr>
                         <p:cNvPr id="109" name="TextBox 108"/>
@@ -19534,8 +19535,8 @@
                     </p:sp>
                   </mc:Fallback>
                 </mc:AlternateContent>
-                <mc:AlternateContent xmlns:mc="http://schemas.openxmlformats.org/markup-compatibility/2006">
-                  <mc:Choice xmlns:a14="http://schemas.microsoft.com/office/drawing/2010/main" Requires="a14">
+                <mc:AlternateContent xmlns:mc="http://schemas.openxmlformats.org/markup-compatibility/2006" xmlns:a14="http://schemas.microsoft.com/office/drawing/2010/main">
+                  <mc:Choice Requires="a14">
                     <p:sp>
                       <p:nvSpPr>
                         <p:cNvPr id="110" name="TextBox 109"/>
@@ -19597,7 +19598,7 @@
                       </p:txBody>
                     </p:sp>
                   </mc:Choice>
-                  <mc:Fallback>
+                  <mc:Fallback xmlns="">
                     <p:sp>
                       <p:nvSpPr>
                         <p:cNvPr id="110" name="TextBox 109"/>
@@ -19636,8 +19637,8 @@
                     </p:sp>
                   </mc:Fallback>
                 </mc:AlternateContent>
-                <mc:AlternateContent xmlns:mc="http://schemas.openxmlformats.org/markup-compatibility/2006">
-                  <mc:Choice xmlns:a14="http://schemas.microsoft.com/office/drawing/2010/main" Requires="a14">
+                <mc:AlternateContent xmlns:mc="http://schemas.openxmlformats.org/markup-compatibility/2006" xmlns:a14="http://schemas.microsoft.com/office/drawing/2010/main">
+                  <mc:Choice Requires="a14">
                     <p:sp>
                       <p:nvSpPr>
                         <p:cNvPr id="111" name="TextBox 110"/>
@@ -19708,7 +19709,7 @@
                       </p:txBody>
                     </p:sp>
                   </mc:Choice>
-                  <mc:Fallback>
+                  <mc:Fallback xmlns="">
                     <p:sp>
                       <p:nvSpPr>
                         <p:cNvPr id="111" name="TextBox 110"/>
@@ -19815,8 +19816,8 @@
                     </a:extLst>
                   </p:spPr>
                 </p:cxnSp>
-                <mc:AlternateContent xmlns:mc="http://schemas.openxmlformats.org/markup-compatibility/2006">
-                  <mc:Choice xmlns:a14="http://schemas.microsoft.com/office/drawing/2010/main" Requires="a14">
+                <mc:AlternateContent xmlns:mc="http://schemas.openxmlformats.org/markup-compatibility/2006" xmlns:a14="http://schemas.microsoft.com/office/drawing/2010/main">
+                  <mc:Choice Requires="a14">
                     <p:sp>
                       <p:nvSpPr>
                         <p:cNvPr id="115" name="TextBox 114"/>
@@ -19878,7 +19879,7 @@
                       </p:txBody>
                     </p:sp>
                   </mc:Choice>
-                  <mc:Fallback>
+                  <mc:Fallback xmlns="">
                     <p:sp>
                       <p:nvSpPr>
                         <p:cNvPr id="115" name="TextBox 114"/>
@@ -19917,8 +19918,8 @@
                     </p:sp>
                   </mc:Fallback>
                 </mc:AlternateContent>
-                <mc:AlternateContent xmlns:mc="http://schemas.openxmlformats.org/markup-compatibility/2006">
-                  <mc:Choice xmlns:a14="http://schemas.microsoft.com/office/drawing/2010/main" Requires="a14">
+                <mc:AlternateContent xmlns:mc="http://schemas.openxmlformats.org/markup-compatibility/2006" xmlns:a14="http://schemas.microsoft.com/office/drawing/2010/main">
+                  <mc:Choice Requires="a14">
                     <p:sp>
                       <p:nvSpPr>
                         <p:cNvPr id="116" name="TextBox 115"/>
@@ -19980,7 +19981,7 @@
                       </p:txBody>
                     </p:sp>
                   </mc:Choice>
-                  <mc:Fallback>
+                  <mc:Fallback xmlns="">
                     <p:sp>
                       <p:nvSpPr>
                         <p:cNvPr id="116" name="TextBox 115"/>
@@ -20019,8 +20020,8 @@
                     </p:sp>
                   </mc:Fallback>
                 </mc:AlternateContent>
-                <mc:AlternateContent xmlns:mc="http://schemas.openxmlformats.org/markup-compatibility/2006">
-                  <mc:Choice xmlns:a14="http://schemas.microsoft.com/office/drawing/2010/main" Requires="a14">
+                <mc:AlternateContent xmlns:mc="http://schemas.openxmlformats.org/markup-compatibility/2006" xmlns:a14="http://schemas.microsoft.com/office/drawing/2010/main">
+                  <mc:Choice Requires="a14">
                     <p:sp>
                       <p:nvSpPr>
                         <p:cNvPr id="117" name="TextBox 116"/>
@@ -20082,7 +20083,7 @@
                       </p:txBody>
                     </p:sp>
                   </mc:Choice>
-                  <mc:Fallback>
+                  <mc:Fallback xmlns="">
                     <p:sp>
                       <p:nvSpPr>
                         <p:cNvPr id="117" name="TextBox 116"/>
@@ -20121,8 +20122,8 @@
                     </p:sp>
                   </mc:Fallback>
                 </mc:AlternateContent>
-                <mc:AlternateContent xmlns:mc="http://schemas.openxmlformats.org/markup-compatibility/2006">
-                  <mc:Choice xmlns:a14="http://schemas.microsoft.com/office/drawing/2010/main" Requires="a14">
+                <mc:AlternateContent xmlns:mc="http://schemas.openxmlformats.org/markup-compatibility/2006" xmlns:a14="http://schemas.microsoft.com/office/drawing/2010/main">
+                  <mc:Choice Requires="a14">
                     <p:sp>
                       <p:nvSpPr>
                         <p:cNvPr id="119" name="TextBox 118"/>
@@ -20193,7 +20194,7 @@
                       </p:txBody>
                     </p:sp>
                   </mc:Choice>
-                  <mc:Fallback>
+                  <mc:Fallback xmlns="">
                     <p:sp>
                       <p:nvSpPr>
                         <p:cNvPr id="119" name="TextBox 118"/>
@@ -20386,8 +20387,8 @@
                 </a:extLst>
               </p:spPr>
             </p:cxnSp>
-            <mc:AlternateContent xmlns:mc="http://schemas.openxmlformats.org/markup-compatibility/2006">
-              <mc:Choice xmlns:a14="http://schemas.microsoft.com/office/drawing/2010/main" Requires="a14">
+            <mc:AlternateContent xmlns:mc="http://schemas.openxmlformats.org/markup-compatibility/2006" xmlns:a14="http://schemas.microsoft.com/office/drawing/2010/main">
+              <mc:Choice Requires="a14">
                 <p:sp>
                   <p:nvSpPr>
                     <p:cNvPr id="125" name="TextBox 124"/>
@@ -20462,7 +20463,7 @@
                   </p:txBody>
                 </p:sp>
               </mc:Choice>
-              <mc:Fallback>
+              <mc:Fallback xmlns="">
                 <p:sp>
                   <p:nvSpPr>
                     <p:cNvPr id="125" name="TextBox 124"/>
@@ -20501,8 +20502,8 @@
                 </p:sp>
               </mc:Fallback>
             </mc:AlternateContent>
-            <mc:AlternateContent xmlns:mc="http://schemas.openxmlformats.org/markup-compatibility/2006">
-              <mc:Choice xmlns:a14="http://schemas.microsoft.com/office/drawing/2010/main" Requires="a14">
+            <mc:AlternateContent xmlns:mc="http://schemas.openxmlformats.org/markup-compatibility/2006" xmlns:a14="http://schemas.microsoft.com/office/drawing/2010/main">
+              <mc:Choice Requires="a14">
                 <p:sp>
                   <p:nvSpPr>
                     <p:cNvPr id="126" name="TextBox 125"/>
@@ -20577,7 +20578,7 @@
                   </p:txBody>
                 </p:sp>
               </mc:Choice>
-              <mc:Fallback>
+              <mc:Fallback xmlns="">
                 <p:sp>
                   <p:nvSpPr>
                     <p:cNvPr id="126" name="TextBox 125"/>
@@ -20616,8 +20617,8 @@
                 </p:sp>
               </mc:Fallback>
             </mc:AlternateContent>
-            <mc:AlternateContent xmlns:mc="http://schemas.openxmlformats.org/markup-compatibility/2006">
-              <mc:Choice xmlns:a14="http://schemas.microsoft.com/office/drawing/2010/main" Requires="a14">
+            <mc:AlternateContent xmlns:mc="http://schemas.openxmlformats.org/markup-compatibility/2006" xmlns:a14="http://schemas.microsoft.com/office/drawing/2010/main">
+              <mc:Choice Requires="a14">
                 <p:sp>
                   <p:nvSpPr>
                     <p:cNvPr id="127" name="TextBox 126"/>
@@ -20692,7 +20693,7 @@
                   </p:txBody>
                 </p:sp>
               </mc:Choice>
-              <mc:Fallback>
+              <mc:Fallback xmlns="">
                 <p:sp>
                   <p:nvSpPr>
                     <p:cNvPr id="127" name="TextBox 126"/>
@@ -20731,8 +20732,8 @@
                 </p:sp>
               </mc:Fallback>
             </mc:AlternateContent>
-            <mc:AlternateContent xmlns:mc="http://schemas.openxmlformats.org/markup-compatibility/2006">
-              <mc:Choice xmlns:a14="http://schemas.microsoft.com/office/drawing/2010/main" Requires="a14">
+            <mc:AlternateContent xmlns:mc="http://schemas.openxmlformats.org/markup-compatibility/2006" xmlns:a14="http://schemas.microsoft.com/office/drawing/2010/main">
+              <mc:Choice Requires="a14">
                 <p:sp>
                   <p:nvSpPr>
                     <p:cNvPr id="128" name="TextBox 127"/>
@@ -20755,6 +20756,7 @@
                     </a:bodyPr>
                     <a:lstStyle/>
                     <a:p>
+                      <a:pPr/>
                       <a14:m>
                         <m:oMathPara xmlns:m="http://schemas.openxmlformats.org/officeDocument/2006/math">
                           <m:oMathParaPr>
@@ -20816,7 +20818,7 @@
                   </p:txBody>
                 </p:sp>
               </mc:Choice>
-              <mc:Fallback>
+              <mc:Fallback xmlns="">
                 <p:sp>
                   <p:nvSpPr>
                     <p:cNvPr id="128" name="TextBox 127"/>
@@ -20957,8 +20959,8 @@
                 </a:extLst>
               </p:spPr>
             </p:cxnSp>
-            <mc:AlternateContent xmlns:mc="http://schemas.openxmlformats.org/markup-compatibility/2006">
-              <mc:Choice xmlns:a14="http://schemas.microsoft.com/office/drawing/2010/main" Requires="a14">
+            <mc:AlternateContent xmlns:mc="http://schemas.openxmlformats.org/markup-compatibility/2006" xmlns:a14="http://schemas.microsoft.com/office/drawing/2010/main">
+              <mc:Choice Requires="a14">
                 <p:sp>
                   <p:nvSpPr>
                     <p:cNvPr id="132" name="TextBox 131"/>
@@ -21033,7 +21035,7 @@
                   </p:txBody>
                 </p:sp>
               </mc:Choice>
-              <mc:Fallback>
+              <mc:Fallback xmlns="">
                 <p:sp>
                   <p:nvSpPr>
                     <p:cNvPr id="132" name="TextBox 131"/>
@@ -21072,8 +21074,8 @@
                 </p:sp>
               </mc:Fallback>
             </mc:AlternateContent>
-            <mc:AlternateContent xmlns:mc="http://schemas.openxmlformats.org/markup-compatibility/2006">
-              <mc:Choice xmlns:a14="http://schemas.microsoft.com/office/drawing/2010/main" Requires="a14">
+            <mc:AlternateContent xmlns:mc="http://schemas.openxmlformats.org/markup-compatibility/2006" xmlns:a14="http://schemas.microsoft.com/office/drawing/2010/main">
+              <mc:Choice Requires="a14">
                 <p:sp>
                   <p:nvSpPr>
                     <p:cNvPr id="133" name="TextBox 132"/>
@@ -21148,7 +21150,7 @@
                   </p:txBody>
                 </p:sp>
               </mc:Choice>
-              <mc:Fallback>
+              <mc:Fallback xmlns="">
                 <p:sp>
                   <p:nvSpPr>
                     <p:cNvPr id="133" name="TextBox 132"/>
@@ -21187,8 +21189,8 @@
                 </p:sp>
               </mc:Fallback>
             </mc:AlternateContent>
-            <mc:AlternateContent xmlns:mc="http://schemas.openxmlformats.org/markup-compatibility/2006">
-              <mc:Choice xmlns:a14="http://schemas.microsoft.com/office/drawing/2010/main" Requires="a14">
+            <mc:AlternateContent xmlns:mc="http://schemas.openxmlformats.org/markup-compatibility/2006" xmlns:a14="http://schemas.microsoft.com/office/drawing/2010/main">
+              <mc:Choice Requires="a14">
                 <p:sp>
                   <p:nvSpPr>
                     <p:cNvPr id="134" name="TextBox 133"/>
@@ -21263,7 +21265,7 @@
                   </p:txBody>
                 </p:sp>
               </mc:Choice>
-              <mc:Fallback>
+              <mc:Fallback xmlns="">
                 <p:sp>
                   <p:nvSpPr>
                     <p:cNvPr id="134" name="TextBox 133"/>
@@ -21302,8 +21304,8 @@
                 </p:sp>
               </mc:Fallback>
             </mc:AlternateContent>
-            <mc:AlternateContent xmlns:mc="http://schemas.openxmlformats.org/markup-compatibility/2006">
-              <mc:Choice xmlns:a14="http://schemas.microsoft.com/office/drawing/2010/main" Requires="a14">
+            <mc:AlternateContent xmlns:mc="http://schemas.openxmlformats.org/markup-compatibility/2006" xmlns:a14="http://schemas.microsoft.com/office/drawing/2010/main">
+              <mc:Choice Requires="a14">
                 <p:sp>
                   <p:nvSpPr>
                     <p:cNvPr id="136" name="TextBox 135"/>
@@ -21326,6 +21328,7 @@
                     </a:bodyPr>
                     <a:lstStyle/>
                     <a:p>
+                      <a:pPr/>
                       <a14:m>
                         <m:oMathPara xmlns:m="http://schemas.openxmlformats.org/officeDocument/2006/math">
                           <m:oMathParaPr>
@@ -21387,7 +21390,7 @@
                   </p:txBody>
                 </p:sp>
               </mc:Choice>
-              <mc:Fallback>
+              <mc:Fallback xmlns="">
                 <p:sp>
                   <p:nvSpPr>
                     <p:cNvPr id="136" name="TextBox 135"/>
@@ -21426,8 +21429,8 @@
                 </p:sp>
               </mc:Fallback>
             </mc:AlternateContent>
-            <mc:AlternateContent xmlns:mc="http://schemas.openxmlformats.org/markup-compatibility/2006">
-              <mc:Choice xmlns:a14="http://schemas.microsoft.com/office/drawing/2010/main" Requires="a14">
+            <mc:AlternateContent xmlns:mc="http://schemas.openxmlformats.org/markup-compatibility/2006" xmlns:a14="http://schemas.microsoft.com/office/drawing/2010/main">
+              <mc:Choice Requires="a14">
                 <p:sp>
                   <p:nvSpPr>
                     <p:cNvPr id="140" name="TextBox 139"/>
@@ -21502,7 +21505,7 @@
                   </p:txBody>
                 </p:sp>
               </mc:Choice>
-              <mc:Fallback>
+              <mc:Fallback xmlns="">
                 <p:sp>
                   <p:nvSpPr>
                     <p:cNvPr id="140" name="TextBox 139"/>
@@ -21541,8 +21544,8 @@
                 </p:sp>
               </mc:Fallback>
             </mc:AlternateContent>
-            <mc:AlternateContent xmlns:mc="http://schemas.openxmlformats.org/markup-compatibility/2006">
-              <mc:Choice xmlns:a14="http://schemas.microsoft.com/office/drawing/2010/main" Requires="a14">
+            <mc:AlternateContent xmlns:mc="http://schemas.openxmlformats.org/markup-compatibility/2006" xmlns:a14="http://schemas.microsoft.com/office/drawing/2010/main">
+              <mc:Choice Requires="a14">
                 <p:sp>
                   <p:nvSpPr>
                     <p:cNvPr id="141" name="TextBox 140"/>
@@ -21617,7 +21620,7 @@
                   </p:txBody>
                 </p:sp>
               </mc:Choice>
-              <mc:Fallback>
+              <mc:Fallback xmlns="">
                 <p:sp>
                   <p:nvSpPr>
                     <p:cNvPr id="141" name="TextBox 140"/>
@@ -21656,8 +21659,8 @@
                 </p:sp>
               </mc:Fallback>
             </mc:AlternateContent>
-            <mc:AlternateContent xmlns:mc="http://schemas.openxmlformats.org/markup-compatibility/2006">
-              <mc:Choice xmlns:a14="http://schemas.microsoft.com/office/drawing/2010/main" Requires="a14">
+            <mc:AlternateContent xmlns:mc="http://schemas.openxmlformats.org/markup-compatibility/2006" xmlns:a14="http://schemas.microsoft.com/office/drawing/2010/main">
+              <mc:Choice Requires="a14">
                 <p:sp>
                   <p:nvSpPr>
                     <p:cNvPr id="142" name="TextBox 141"/>
@@ -21732,7 +21735,7 @@
                   </p:txBody>
                 </p:sp>
               </mc:Choice>
-              <mc:Fallback>
+              <mc:Fallback xmlns="">
                 <p:sp>
                   <p:nvSpPr>
                     <p:cNvPr id="142" name="TextBox 141"/>
@@ -21771,8 +21774,8 @@
                 </p:sp>
               </mc:Fallback>
             </mc:AlternateContent>
-            <mc:AlternateContent xmlns:mc="http://schemas.openxmlformats.org/markup-compatibility/2006">
-              <mc:Choice xmlns:a14="http://schemas.microsoft.com/office/drawing/2010/main" Requires="a14">
+            <mc:AlternateContent xmlns:mc="http://schemas.openxmlformats.org/markup-compatibility/2006" xmlns:a14="http://schemas.microsoft.com/office/drawing/2010/main">
+              <mc:Choice Requires="a14">
                 <p:sp>
                   <p:nvSpPr>
                     <p:cNvPr id="147" name="TextBox 146"/>
@@ -21847,7 +21850,7 @@
                   </p:txBody>
                 </p:sp>
               </mc:Choice>
-              <mc:Fallback>
+              <mc:Fallback xmlns="">
                 <p:sp>
                   <p:nvSpPr>
                     <p:cNvPr id="147" name="TextBox 146"/>
@@ -21886,8 +21889,8 @@
                 </p:sp>
               </mc:Fallback>
             </mc:AlternateContent>
-            <mc:AlternateContent xmlns:mc="http://schemas.openxmlformats.org/markup-compatibility/2006">
-              <mc:Choice xmlns:a14="http://schemas.microsoft.com/office/drawing/2010/main" Requires="a14">
+            <mc:AlternateContent xmlns:mc="http://schemas.openxmlformats.org/markup-compatibility/2006" xmlns:a14="http://schemas.microsoft.com/office/drawing/2010/main">
+              <mc:Choice Requires="a14">
                 <p:sp>
                   <p:nvSpPr>
                     <p:cNvPr id="148" name="TextBox 147"/>
@@ -21962,7 +21965,7 @@
                   </p:txBody>
                 </p:sp>
               </mc:Choice>
-              <mc:Fallback>
+              <mc:Fallback xmlns="">
                 <p:sp>
                   <p:nvSpPr>
                     <p:cNvPr id="148" name="TextBox 147"/>
@@ -22001,8 +22004,8 @@
                 </p:sp>
               </mc:Fallback>
             </mc:AlternateContent>
-            <mc:AlternateContent xmlns:mc="http://schemas.openxmlformats.org/markup-compatibility/2006">
-              <mc:Choice xmlns:a14="http://schemas.microsoft.com/office/drawing/2010/main" Requires="a14">
+            <mc:AlternateContent xmlns:mc="http://schemas.openxmlformats.org/markup-compatibility/2006" xmlns:a14="http://schemas.microsoft.com/office/drawing/2010/main">
+              <mc:Choice Requires="a14">
                 <p:sp>
                   <p:nvSpPr>
                     <p:cNvPr id="149" name="TextBox 148"/>
@@ -22077,7 +22080,7 @@
                   </p:txBody>
                 </p:sp>
               </mc:Choice>
-              <mc:Fallback>
+              <mc:Fallback xmlns="">
                 <p:sp>
                   <p:nvSpPr>
                     <p:cNvPr id="149" name="TextBox 148"/>
@@ -22116,8 +22119,8 @@
                 </p:sp>
               </mc:Fallback>
             </mc:AlternateContent>
-            <mc:AlternateContent xmlns:mc="http://schemas.openxmlformats.org/markup-compatibility/2006">
-              <mc:Choice xmlns:a14="http://schemas.microsoft.com/office/drawing/2010/main" Requires="a14">
+            <mc:AlternateContent xmlns:mc="http://schemas.openxmlformats.org/markup-compatibility/2006" xmlns:a14="http://schemas.microsoft.com/office/drawing/2010/main">
+              <mc:Choice Requires="a14">
                 <p:sp>
                   <p:nvSpPr>
                     <p:cNvPr id="151" name="TextBox 150"/>
@@ -22140,6 +22143,7 @@
                     </a:bodyPr>
                     <a:lstStyle/>
                     <a:p>
+                      <a:pPr/>
                       <a14:m>
                         <m:oMathPara xmlns:m="http://schemas.openxmlformats.org/officeDocument/2006/math">
                           <m:oMathParaPr>
@@ -22201,7 +22205,7 @@
                   </p:txBody>
                 </p:sp>
               </mc:Choice>
-              <mc:Fallback>
+              <mc:Fallback xmlns="">
                 <p:sp>
                   <p:nvSpPr>
                     <p:cNvPr id="151" name="TextBox 150"/>
@@ -22377,8 +22381,8 @@
               </a:extLst>
             </p:spPr>
           </p:cxnSp>
-          <mc:AlternateContent xmlns:mc="http://schemas.openxmlformats.org/markup-compatibility/2006">
-            <mc:Choice xmlns:a14="http://schemas.microsoft.com/office/drawing/2010/main" Requires="a14">
+          <mc:AlternateContent xmlns:mc="http://schemas.openxmlformats.org/markup-compatibility/2006" xmlns:a14="http://schemas.microsoft.com/office/drawing/2010/main">
+            <mc:Choice Requires="a14">
               <p:sp>
                 <p:nvSpPr>
                   <p:cNvPr id="163" name="TextBox 162"/>
@@ -22453,7 +22457,7 @@
                 </p:txBody>
               </p:sp>
             </mc:Choice>
-            <mc:Fallback>
+            <mc:Fallback xmlns="">
               <p:sp>
                 <p:nvSpPr>
                   <p:cNvPr id="163" name="TextBox 162"/>
@@ -22492,8 +22496,8 @@
               </p:sp>
             </mc:Fallback>
           </mc:AlternateContent>
-          <mc:AlternateContent xmlns:mc="http://schemas.openxmlformats.org/markup-compatibility/2006">
-            <mc:Choice xmlns:a14="http://schemas.microsoft.com/office/drawing/2010/main" Requires="a14">
+          <mc:AlternateContent xmlns:mc="http://schemas.openxmlformats.org/markup-compatibility/2006" xmlns:a14="http://schemas.microsoft.com/office/drawing/2010/main">
+            <mc:Choice Requires="a14">
               <p:sp>
                 <p:nvSpPr>
                   <p:cNvPr id="164" name="TextBox 163"/>
@@ -22568,7 +22572,7 @@
                 </p:txBody>
               </p:sp>
             </mc:Choice>
-            <mc:Fallback>
+            <mc:Fallback xmlns="">
               <p:sp>
                 <p:nvSpPr>
                   <p:cNvPr id="164" name="TextBox 163"/>
@@ -22607,8 +22611,8 @@
               </p:sp>
             </mc:Fallback>
           </mc:AlternateContent>
-          <mc:AlternateContent xmlns:mc="http://schemas.openxmlformats.org/markup-compatibility/2006">
-            <mc:Choice xmlns:a14="http://schemas.microsoft.com/office/drawing/2010/main" Requires="a14">
+          <mc:AlternateContent xmlns:mc="http://schemas.openxmlformats.org/markup-compatibility/2006" xmlns:a14="http://schemas.microsoft.com/office/drawing/2010/main">
+            <mc:Choice Requires="a14">
               <p:sp>
                 <p:nvSpPr>
                   <p:cNvPr id="165" name="TextBox 164"/>
@@ -22683,7 +22687,7 @@
                 </p:txBody>
               </p:sp>
             </mc:Choice>
-            <mc:Fallback>
+            <mc:Fallback xmlns="">
               <p:sp>
                 <p:nvSpPr>
                   <p:cNvPr id="165" name="TextBox 164"/>
@@ -22722,8 +22726,8 @@
               </p:sp>
             </mc:Fallback>
           </mc:AlternateContent>
-          <mc:AlternateContent xmlns:mc="http://schemas.openxmlformats.org/markup-compatibility/2006">
-            <mc:Choice xmlns:a14="http://schemas.microsoft.com/office/drawing/2010/main" Requires="a14">
+          <mc:AlternateContent xmlns:mc="http://schemas.openxmlformats.org/markup-compatibility/2006" xmlns:a14="http://schemas.microsoft.com/office/drawing/2010/main">
+            <mc:Choice Requires="a14">
               <p:sp>
                 <p:nvSpPr>
                   <p:cNvPr id="166" name="TextBox 165"/>
@@ -22746,6 +22750,7 @@
                   </a:bodyPr>
                   <a:lstStyle/>
                   <a:p>
+                    <a:pPr/>
                     <a14:m>
                       <m:oMathPara xmlns:m="http://schemas.openxmlformats.org/officeDocument/2006/math">
                         <m:oMathParaPr>
@@ -22807,7 +22812,7 @@
                 </p:txBody>
               </p:sp>
             </mc:Choice>
-            <mc:Fallback>
+            <mc:Fallback xmlns="">
               <p:sp>
                 <p:nvSpPr>
                   <p:cNvPr id="166" name="TextBox 165"/>
@@ -23560,8 +23565,8 @@
               </a:extLst>
             </p:spPr>
           </p:cxnSp>
-          <mc:AlternateContent xmlns:mc="http://schemas.openxmlformats.org/markup-compatibility/2006">
-            <mc:Choice xmlns:a14="http://schemas.microsoft.com/office/drawing/2010/main" Requires="a14">
+          <mc:AlternateContent xmlns:mc="http://schemas.openxmlformats.org/markup-compatibility/2006" xmlns:a14="http://schemas.microsoft.com/office/drawing/2010/main">
+            <mc:Choice Requires="a14">
               <p:sp>
                 <p:nvSpPr>
                   <p:cNvPr id="188" name="TextBox 187"/>
@@ -23636,7 +23641,7 @@
                 </p:txBody>
               </p:sp>
             </mc:Choice>
-            <mc:Fallback>
+            <mc:Fallback xmlns="">
               <p:sp>
                 <p:nvSpPr>
                   <p:cNvPr id="188" name="TextBox 187"/>
@@ -23675,8 +23680,8 @@
               </p:sp>
             </mc:Fallback>
           </mc:AlternateContent>
-          <mc:AlternateContent xmlns:mc="http://schemas.openxmlformats.org/markup-compatibility/2006">
-            <mc:Choice xmlns:a14="http://schemas.microsoft.com/office/drawing/2010/main" Requires="a14">
+          <mc:AlternateContent xmlns:mc="http://schemas.openxmlformats.org/markup-compatibility/2006" xmlns:a14="http://schemas.microsoft.com/office/drawing/2010/main">
+            <mc:Choice Requires="a14">
               <p:sp>
                 <p:nvSpPr>
                   <p:cNvPr id="189" name="TextBox 188"/>
@@ -23751,7 +23756,7 @@
                 </p:txBody>
               </p:sp>
             </mc:Choice>
-            <mc:Fallback>
+            <mc:Fallback xmlns="">
               <p:sp>
                 <p:nvSpPr>
                   <p:cNvPr id="189" name="TextBox 188"/>
@@ -23790,8 +23795,8 @@
               </p:sp>
             </mc:Fallback>
           </mc:AlternateContent>
-          <mc:AlternateContent xmlns:mc="http://schemas.openxmlformats.org/markup-compatibility/2006">
-            <mc:Choice xmlns:a14="http://schemas.microsoft.com/office/drawing/2010/main" Requires="a14">
+          <mc:AlternateContent xmlns:mc="http://schemas.openxmlformats.org/markup-compatibility/2006" xmlns:a14="http://schemas.microsoft.com/office/drawing/2010/main">
+            <mc:Choice Requires="a14">
               <p:sp>
                 <p:nvSpPr>
                   <p:cNvPr id="190" name="TextBox 189"/>
@@ -23866,7 +23871,7 @@
                 </p:txBody>
               </p:sp>
             </mc:Choice>
-            <mc:Fallback>
+            <mc:Fallback xmlns="">
               <p:sp>
                 <p:nvSpPr>
                   <p:cNvPr id="190" name="TextBox 189"/>
@@ -23905,8 +23910,8 @@
               </p:sp>
             </mc:Fallback>
           </mc:AlternateContent>
-          <mc:AlternateContent xmlns:mc="http://schemas.openxmlformats.org/markup-compatibility/2006">
-            <mc:Choice xmlns:a14="http://schemas.microsoft.com/office/drawing/2010/main" Requires="a14">
+          <mc:AlternateContent xmlns:mc="http://schemas.openxmlformats.org/markup-compatibility/2006" xmlns:a14="http://schemas.microsoft.com/office/drawing/2010/main">
+            <mc:Choice Requires="a14">
               <p:sp>
                 <p:nvSpPr>
                   <p:cNvPr id="191" name="TextBox 190"/>
@@ -23929,6 +23934,7 @@
                   </a:bodyPr>
                   <a:lstStyle/>
                   <a:p>
+                    <a:pPr/>
                     <a14:m>
                       <m:oMathPara xmlns:m="http://schemas.openxmlformats.org/officeDocument/2006/math">
                         <m:oMathParaPr>
@@ -23990,7 +23996,7 @@
                 </p:txBody>
               </p:sp>
             </mc:Choice>
-            <mc:Fallback>
+            <mc:Fallback xmlns="">
               <p:sp>
                 <p:nvSpPr>
                   <p:cNvPr id="191" name="TextBox 190"/>
@@ -24239,6 +24245,2312 @@
     <p:extLst>
       <p:ext uri="{BB962C8B-B14F-4D97-AF65-F5344CB8AC3E}">
         <p14:creationId xmlns:p14="http://schemas.microsoft.com/office/powerpoint/2010/main" val="1066927613"/>
+      </p:ext>
+    </p:extLst>
+  </p:cSld>
+  <p:clrMapOvr>
+    <a:masterClrMapping/>
+  </p:clrMapOvr>
+</p:sld>
+</file>
+
+<file path=ppt/slides/slide4.xml><?xml version="1.0" encoding="utf-8"?>
+<p:sld xmlns:a="http://schemas.openxmlformats.org/drawingml/2006/main" xmlns:r="http://schemas.openxmlformats.org/officeDocument/2006/relationships" xmlns:p="http://schemas.openxmlformats.org/presentationml/2006/main">
+  <p:cSld>
+    <p:spTree>
+      <p:nvGrpSpPr>
+        <p:cNvPr id="1" name=""/>
+        <p:cNvGrpSpPr/>
+        <p:nvPr/>
+      </p:nvGrpSpPr>
+      <p:grpSpPr>
+        <a:xfrm>
+          <a:off x="0" y="0"/>
+          <a:ext cx="0" cy="0"/>
+          <a:chOff x="0" y="0"/>
+          <a:chExt cx="0" cy="0"/>
+        </a:xfrm>
+      </p:grpSpPr>
+      <p:grpSp>
+        <p:nvGrpSpPr>
+          <p:cNvPr id="58" name="Group 57"/>
+          <p:cNvGrpSpPr/>
+          <p:nvPr/>
+        </p:nvGrpSpPr>
+        <p:grpSpPr>
+          <a:xfrm>
+            <a:off x="3932408" y="1434243"/>
+            <a:ext cx="5101178" cy="4375149"/>
+            <a:chOff x="3932408" y="1434243"/>
+            <a:chExt cx="5101178" cy="4375149"/>
+          </a:xfrm>
+        </p:grpSpPr>
+        <p:cxnSp>
+          <p:nvCxnSpPr>
+            <p:cNvPr id="4" name="Straight Arrow Connector 3"/>
+            <p:cNvCxnSpPr/>
+            <p:nvPr/>
+          </p:nvCxnSpPr>
+          <p:spPr>
+            <a:xfrm flipH="1" flipV="1">
+              <a:off x="4832046" y="1434243"/>
+              <a:ext cx="2584450" cy="4375149"/>
+            </a:xfrm>
+            <a:prstGeom prst="straightConnector1">
+              <a:avLst/>
+            </a:prstGeom>
+            <a:ln w="12700" cmpd="sng">
+              <a:solidFill>
+                <a:schemeClr val="tx1"/>
+              </a:solidFill>
+              <a:prstDash val="sysDash"/>
+              <a:headEnd type="none" w="med" len="med"/>
+              <a:tailEnd type="none" w="med" len="med"/>
+            </a:ln>
+            <a:effectLst/>
+          </p:spPr>
+          <p:style>
+            <a:lnRef idx="2">
+              <a:schemeClr val="accent1"/>
+            </a:lnRef>
+            <a:fillRef idx="0">
+              <a:schemeClr val="accent1"/>
+            </a:fillRef>
+            <a:effectRef idx="1">
+              <a:schemeClr val="accent1"/>
+            </a:effectRef>
+            <a:fontRef idx="minor">
+              <a:schemeClr val="tx1"/>
+            </a:fontRef>
+          </p:style>
+        </p:cxnSp>
+        <p:sp>
+          <p:nvSpPr>
+            <p:cNvPr id="6" name="Oval 5"/>
+            <p:cNvSpPr/>
+            <p:nvPr/>
+          </p:nvSpPr>
+          <p:spPr>
+            <a:xfrm rot="20450794">
+              <a:off x="6113343" y="1861389"/>
+              <a:ext cx="2530189" cy="1619317"/>
+            </a:xfrm>
+            <a:prstGeom prst="ellipse">
+              <a:avLst/>
+            </a:prstGeom>
+            <a:noFill/>
+            <a:ln w="12700" cmpd="sng">
+              <a:solidFill>
+                <a:srgbClr val="000000"/>
+              </a:solidFill>
+            </a:ln>
+            <a:effectLst/>
+          </p:spPr>
+          <p:style>
+            <a:lnRef idx="1">
+              <a:schemeClr val="accent1"/>
+            </a:lnRef>
+            <a:fillRef idx="3">
+              <a:schemeClr val="accent1"/>
+            </a:fillRef>
+            <a:effectRef idx="2">
+              <a:schemeClr val="accent1"/>
+            </a:effectRef>
+            <a:fontRef idx="minor">
+              <a:schemeClr val="lt1"/>
+            </a:fontRef>
+          </p:style>
+          <p:txBody>
+            <a:bodyPr rtlCol="0" anchor="ctr"/>
+            <a:lstStyle/>
+            <a:p>
+              <a:pPr algn="ctr"/>
+              <a:endParaRPr lang="en-US"/>
+            </a:p>
+          </p:txBody>
+        </p:sp>
+        <mc:AlternateContent xmlns:mc="http://schemas.openxmlformats.org/markup-compatibility/2006">
+          <mc:Choice xmlns:a14="http://schemas.microsoft.com/office/drawing/2010/main" Requires="a14">
+            <p:sp>
+              <p:nvSpPr>
+                <p:cNvPr id="8" name="TextBox 7"/>
+                <p:cNvSpPr txBox="1"/>
+                <p:nvPr/>
+              </p:nvSpPr>
+              <p:spPr>
+                <a:xfrm>
+                  <a:off x="6430609" y="2320252"/>
+                  <a:ext cx="565348" cy="472950"/>
+                </a:xfrm>
+                <a:prstGeom prst="rect">
+                  <a:avLst/>
+                </a:prstGeom>
+                <a:noFill/>
+              </p:spPr>
+              <p:txBody>
+                <a:bodyPr wrap="none" lIns="0" tIns="0" rIns="0" bIns="0" rtlCol="0">
+                  <a:spAutoFit/>
+                </a:bodyPr>
+                <a:lstStyle/>
+                <a:p>
+                  <a:pPr/>
+                  <a14:m>
+                    <m:oMathPara xmlns:m="http://schemas.openxmlformats.org/officeDocument/2006/math">
+                      <m:oMathParaPr>
+                        <m:jc m:val="centerGroup"/>
+                      </m:oMathParaPr>
+                      <m:oMath xmlns:m="http://schemas.openxmlformats.org/officeDocument/2006/math">
+                        <m:sSub>
+                          <m:sSubPr>
+                            <m:ctrlPr>
+                              <a:rPr lang="en-US" sz="2800" i="1" smtClean="0">
+                                <a:latin typeface="Cambria Math" charset="0"/>
+                              </a:rPr>
+                            </m:ctrlPr>
+                          </m:sSubPr>
+                          <m:e>
+                            <m:r>
+                              <a:rPr lang="en-US" sz="2800" b="0" i="1" smtClean="0">
+                                <a:latin typeface="Cambria Math" charset="0"/>
+                              </a:rPr>
+                              <m:t>𝑂</m:t>
+                            </m:r>
+                          </m:e>
+                          <m:sub>
+                            <m:sSub>
+                              <m:sSubPr>
+                                <m:ctrlPr>
+                                  <a:rPr lang="en-US" sz="2800" i="1">
+                                    <a:latin typeface="Cambria Math" charset="0"/>
+                                  </a:rPr>
+                                </m:ctrlPr>
+                              </m:sSubPr>
+                              <m:e>
+                                <m:r>
+                                  <a:rPr lang="en-US" sz="2800" i="1">
+                                    <a:latin typeface="Cambria Math" charset="0"/>
+                                  </a:rPr>
+                                  <m:t>ℒ</m:t>
+                                </m:r>
+                              </m:e>
+                              <m:sub>
+                                <m:r>
+                                  <a:rPr lang="en-US" sz="2800" i="1">
+                                    <a:latin typeface="Cambria Math" charset="0"/>
+                                  </a:rPr>
+                                  <m:t>𝑖</m:t>
+                                </m:r>
+                              </m:sub>
+                            </m:sSub>
+                          </m:sub>
+                        </m:sSub>
+                      </m:oMath>
+                    </m:oMathPara>
+                  </a14:m>
+                  <a:endParaRPr lang="en-US" sz="2800" dirty="0"/>
+                </a:p>
+              </p:txBody>
+            </p:sp>
+          </mc:Choice>
+          <mc:Fallback>
+            <p:sp>
+              <p:nvSpPr>
+                <p:cNvPr id="8" name="TextBox 7"/>
+                <p:cNvSpPr txBox="1">
+                  <a:spLocks noRot="1" noChangeAspect="1" noMove="1" noResize="1" noEditPoints="1" noAdjustHandles="1" noChangeArrowheads="1" noChangeShapeType="1" noTextEdit="1"/>
+                </p:cNvSpPr>
+                <p:nvPr/>
+              </p:nvSpPr>
+              <p:spPr>
+                <a:xfrm>
+                  <a:off x="6430609" y="2320252"/>
+                  <a:ext cx="565348" cy="472950"/>
+                </a:xfrm>
+                <a:prstGeom prst="rect">
+                  <a:avLst/>
+                </a:prstGeom>
+                <a:blipFill rotWithShape="0">
+                  <a:blip r:embed="rId2"/>
+                  <a:stretch>
+                    <a:fillRect/>
+                  </a:stretch>
+                </a:blipFill>
+              </p:spPr>
+              <p:txBody>
+                <a:bodyPr/>
+                <a:lstStyle/>
+                <a:p>
+                  <a:r>
+                    <a:rPr lang="en-US">
+                      <a:noFill/>
+                    </a:rPr>
+                    <a:t> </a:t>
+                  </a:r>
+                </a:p>
+              </p:txBody>
+            </p:sp>
+          </mc:Fallback>
+        </mc:AlternateContent>
+        <p:sp>
+          <p:nvSpPr>
+            <p:cNvPr id="9" name="Can 8"/>
+            <p:cNvSpPr/>
+            <p:nvPr/>
+          </p:nvSpPr>
+          <p:spPr>
+            <a:xfrm rot="19767039">
+              <a:off x="5881024" y="2987703"/>
+              <a:ext cx="608037" cy="1490232"/>
+            </a:xfrm>
+            <a:prstGeom prst="can">
+              <a:avLst/>
+            </a:prstGeom>
+            <a:noFill/>
+            <a:ln w="12700">
+              <a:solidFill>
+                <a:schemeClr val="tx1"/>
+              </a:solidFill>
+            </a:ln>
+            <a:effectLst/>
+          </p:spPr>
+          <p:style>
+            <a:lnRef idx="1">
+              <a:schemeClr val="accent1"/>
+            </a:lnRef>
+            <a:fillRef idx="3">
+              <a:schemeClr val="accent1"/>
+            </a:fillRef>
+            <a:effectRef idx="2">
+              <a:schemeClr val="accent1"/>
+            </a:effectRef>
+            <a:fontRef idx="minor">
+              <a:schemeClr val="lt1"/>
+            </a:fontRef>
+          </p:style>
+          <p:txBody>
+            <a:bodyPr rtlCol="0" anchor="ctr"/>
+            <a:lstStyle/>
+            <a:p>
+              <a:pPr algn="ctr"/>
+              <a:endParaRPr lang="en-US"/>
+            </a:p>
+          </p:txBody>
+        </p:sp>
+        <mc:AlternateContent xmlns:mc="http://schemas.openxmlformats.org/markup-compatibility/2006">
+          <mc:Choice xmlns:a14="http://schemas.microsoft.com/office/drawing/2010/main" Requires="a14">
+            <p:sp>
+              <p:nvSpPr>
+                <p:cNvPr id="10" name="TextBox 9"/>
+                <p:cNvSpPr txBox="1"/>
+                <p:nvPr/>
+              </p:nvSpPr>
+              <p:spPr>
+                <a:xfrm>
+                  <a:off x="5326821" y="3317319"/>
+                  <a:ext cx="401327" cy="430887"/>
+                </a:xfrm>
+                <a:prstGeom prst="rect">
+                  <a:avLst/>
+                </a:prstGeom>
+                <a:noFill/>
+              </p:spPr>
+              <p:txBody>
+                <a:bodyPr wrap="none" lIns="0" tIns="0" rIns="0" bIns="0" rtlCol="0">
+                  <a:spAutoFit/>
+                </a:bodyPr>
+                <a:lstStyle/>
+                <a:p>
+                  <a:pPr/>
+                  <a14:m>
+                    <m:oMathPara xmlns:m="http://schemas.openxmlformats.org/officeDocument/2006/math">
+                      <m:oMathParaPr>
+                        <m:jc m:val="centerGroup"/>
+                      </m:oMathParaPr>
+                      <m:oMath xmlns:m="http://schemas.openxmlformats.org/officeDocument/2006/math">
+                        <m:sSub>
+                          <m:sSubPr>
+                            <m:ctrlPr>
+                              <a:rPr lang="en-US" sz="2800" i="1" smtClean="0">
+                                <a:latin typeface="Cambria Math" charset="0"/>
+                              </a:rPr>
+                            </m:ctrlPr>
+                          </m:sSubPr>
+                          <m:e>
+                            <m:r>
+                              <a:rPr lang="en-US" sz="2800" b="0" i="1" smtClean="0">
+                                <a:latin typeface="Cambria Math" charset="0"/>
+                              </a:rPr>
+                              <m:t>𝒥</m:t>
+                            </m:r>
+                          </m:e>
+                          <m:sub>
+                            <m:r>
+                              <a:rPr lang="en-US" sz="2800" b="0" i="1" smtClean="0">
+                                <a:latin typeface="Cambria Math" charset="0"/>
+                              </a:rPr>
+                              <m:t>𝑖</m:t>
+                            </m:r>
+                          </m:sub>
+                        </m:sSub>
+                      </m:oMath>
+                    </m:oMathPara>
+                  </a14:m>
+                  <a:endParaRPr lang="en-US" sz="2800" dirty="0"/>
+                </a:p>
+              </p:txBody>
+            </p:sp>
+          </mc:Choice>
+          <mc:Fallback>
+            <p:sp>
+              <p:nvSpPr>
+                <p:cNvPr id="10" name="TextBox 9"/>
+                <p:cNvSpPr txBox="1">
+                  <a:spLocks noRot="1" noChangeAspect="1" noMove="1" noResize="1" noEditPoints="1" noAdjustHandles="1" noChangeArrowheads="1" noChangeShapeType="1" noTextEdit="1"/>
+                </p:cNvSpPr>
+                <p:nvPr/>
+              </p:nvSpPr>
+              <p:spPr>
+                <a:xfrm>
+                  <a:off x="5326821" y="3317319"/>
+                  <a:ext cx="401327" cy="430887"/>
+                </a:xfrm>
+                <a:prstGeom prst="rect">
+                  <a:avLst/>
+                </a:prstGeom>
+                <a:blipFill rotWithShape="0">
+                  <a:blip r:embed="rId3"/>
+                  <a:stretch>
+                    <a:fillRect/>
+                  </a:stretch>
+                </a:blipFill>
+              </p:spPr>
+              <p:txBody>
+                <a:bodyPr/>
+                <a:lstStyle/>
+                <a:p>
+                  <a:r>
+                    <a:rPr lang="en-US">
+                      <a:noFill/>
+                    </a:rPr>
+                    <a:t> </a:t>
+                  </a:r>
+                </a:p>
+              </p:txBody>
+            </p:sp>
+          </mc:Fallback>
+        </mc:AlternateContent>
+        <p:cxnSp>
+          <p:nvCxnSpPr>
+            <p:cNvPr id="14" name="Straight Arrow Connector 13"/>
+            <p:cNvCxnSpPr/>
+            <p:nvPr/>
+          </p:nvCxnSpPr>
+          <p:spPr>
+            <a:xfrm flipH="1" flipV="1">
+              <a:off x="6085472" y="3564368"/>
+              <a:ext cx="349127" cy="599619"/>
+            </a:xfrm>
+            <a:prstGeom prst="straightConnector1">
+              <a:avLst/>
+            </a:prstGeom>
+            <a:ln w="19050" cmpd="sng">
+              <a:solidFill>
+                <a:schemeClr val="tx1"/>
+              </a:solidFill>
+              <a:headEnd type="none"/>
+              <a:tailEnd type="stealth"/>
+            </a:ln>
+            <a:effectLst/>
+          </p:spPr>
+          <p:style>
+            <a:lnRef idx="2">
+              <a:schemeClr val="accent1"/>
+            </a:lnRef>
+            <a:fillRef idx="0">
+              <a:schemeClr val="accent1"/>
+            </a:fillRef>
+            <a:effectRef idx="1">
+              <a:schemeClr val="accent1"/>
+            </a:effectRef>
+            <a:fontRef idx="minor">
+              <a:schemeClr val="tx1"/>
+            </a:fontRef>
+          </p:style>
+        </p:cxnSp>
+        <mc:AlternateContent xmlns:mc="http://schemas.openxmlformats.org/markup-compatibility/2006">
+          <mc:Choice xmlns:a14="http://schemas.microsoft.com/office/drawing/2010/main" Requires="a14">
+            <p:sp>
+              <p:nvSpPr>
+                <p:cNvPr id="15" name="TextBox 14"/>
+                <p:cNvSpPr txBox="1"/>
+                <p:nvPr/>
+              </p:nvSpPr>
+              <p:spPr>
+                <a:xfrm>
+                  <a:off x="8020373" y="2187314"/>
+                  <a:ext cx="416909" cy="430887"/>
+                </a:xfrm>
+                <a:prstGeom prst="rect">
+                  <a:avLst/>
+                </a:prstGeom>
+                <a:noFill/>
+              </p:spPr>
+              <p:txBody>
+                <a:bodyPr wrap="none" lIns="0" tIns="0" rIns="0" bIns="0" rtlCol="0">
+                  <a:spAutoFit/>
+                </a:bodyPr>
+                <a:lstStyle/>
+                <a:p>
+                  <a:pPr/>
+                  <a14:m>
+                    <m:oMathPara xmlns:m="http://schemas.openxmlformats.org/officeDocument/2006/math">
+                      <m:oMathParaPr>
+                        <m:jc m:val="centerGroup"/>
+                      </m:oMathParaPr>
+                      <m:oMath xmlns:m="http://schemas.openxmlformats.org/officeDocument/2006/math">
+                        <m:sSub>
+                          <m:sSubPr>
+                            <m:ctrlPr>
+                              <a:rPr lang="en-US" sz="2800" i="1" smtClean="0">
+                                <a:latin typeface="Cambria Math" charset="0"/>
+                              </a:rPr>
+                            </m:ctrlPr>
+                          </m:sSubPr>
+                          <m:e>
+                            <m:r>
+                              <a:rPr lang="en-US" sz="2800" b="0" i="1" smtClean="0">
+                                <a:latin typeface="Cambria Math" charset="0"/>
+                              </a:rPr>
+                              <m:t>ℒ</m:t>
+                            </m:r>
+                          </m:e>
+                          <m:sub>
+                            <m:r>
+                              <a:rPr lang="en-US" sz="2800" b="0" i="1" smtClean="0">
+                                <a:latin typeface="Cambria Math" charset="0"/>
+                              </a:rPr>
+                              <m:t>𝑖</m:t>
+                            </m:r>
+                          </m:sub>
+                        </m:sSub>
+                      </m:oMath>
+                    </m:oMathPara>
+                  </a14:m>
+                  <a:endParaRPr lang="en-US" sz="2800" dirty="0"/>
+                </a:p>
+              </p:txBody>
+            </p:sp>
+          </mc:Choice>
+          <mc:Fallback>
+            <p:sp>
+              <p:nvSpPr>
+                <p:cNvPr id="15" name="TextBox 14"/>
+                <p:cNvSpPr txBox="1">
+                  <a:spLocks noRot="1" noChangeAspect="1" noMove="1" noResize="1" noEditPoints="1" noAdjustHandles="1" noChangeArrowheads="1" noChangeShapeType="1" noTextEdit="1"/>
+                </p:cNvSpPr>
+                <p:nvPr/>
+              </p:nvSpPr>
+              <p:spPr>
+                <a:xfrm>
+                  <a:off x="8020373" y="2187314"/>
+                  <a:ext cx="416909" cy="430887"/>
+                </a:xfrm>
+                <a:prstGeom prst="rect">
+                  <a:avLst/>
+                </a:prstGeom>
+                <a:blipFill rotWithShape="0">
+                  <a:blip r:embed="rId4"/>
+                  <a:stretch>
+                    <a:fillRect/>
+                  </a:stretch>
+                </a:blipFill>
+              </p:spPr>
+              <p:txBody>
+                <a:bodyPr/>
+                <a:lstStyle/>
+                <a:p>
+                  <a:r>
+                    <a:rPr lang="en-US">
+                      <a:noFill/>
+                    </a:rPr>
+                    <a:t> </a:t>
+                  </a:r>
+                </a:p>
+              </p:txBody>
+            </p:sp>
+          </mc:Fallback>
+        </mc:AlternateContent>
+        <mc:AlternateContent xmlns:mc="http://schemas.openxmlformats.org/markup-compatibility/2006">
+          <mc:Choice xmlns:a14="http://schemas.microsoft.com/office/drawing/2010/main" Requires="a14">
+            <p:sp>
+              <p:nvSpPr>
+                <p:cNvPr id="16" name="TextBox 15"/>
+                <p:cNvSpPr txBox="1"/>
+                <p:nvPr/>
+              </p:nvSpPr>
+              <p:spPr>
+                <a:xfrm>
+                  <a:off x="6163916" y="3419549"/>
+                  <a:ext cx="364331" cy="430887"/>
+                </a:xfrm>
+                <a:prstGeom prst="rect">
+                  <a:avLst/>
+                </a:prstGeom>
+                <a:noFill/>
+              </p:spPr>
+              <p:txBody>
+                <a:bodyPr wrap="none" lIns="0" tIns="0" rIns="0" bIns="0" rtlCol="0">
+                  <a:spAutoFit/>
+                </a:bodyPr>
+                <a:lstStyle/>
+                <a:p>
+                  <a:pPr/>
+                  <a14:m>
+                    <m:oMathPara xmlns:m="http://schemas.openxmlformats.org/officeDocument/2006/math">
+                      <m:oMathParaPr>
+                        <m:jc m:val="centerGroup"/>
+                      </m:oMathParaPr>
+                      <m:oMath xmlns:m="http://schemas.openxmlformats.org/officeDocument/2006/math">
+                        <m:sSub>
+                          <m:sSubPr>
+                            <m:ctrlPr>
+                              <a:rPr lang="en-US" sz="2800" i="1" smtClean="0">
+                                <a:latin typeface="Cambria Math" charset="0"/>
+                              </a:rPr>
+                            </m:ctrlPr>
+                          </m:sSubPr>
+                          <m:e>
+                            <m:acc>
+                              <m:accPr>
+                                <m:chr m:val="̂"/>
+                                <m:ctrlPr>
+                                  <a:rPr lang="en-US" sz="2800" i="1" smtClean="0">
+                                    <a:latin typeface="Cambria Math" charset="0"/>
+                                  </a:rPr>
+                                </m:ctrlPr>
+                              </m:accPr>
+                              <m:e>
+                                <m:r>
+                                  <a:rPr lang="en-US" sz="2800" b="0" i="1" smtClean="0">
+                                    <a:latin typeface="Cambria Math" charset="0"/>
+                                  </a:rPr>
+                                  <m:t>𝑒</m:t>
+                                </m:r>
+                              </m:e>
+                            </m:acc>
+                          </m:e>
+                          <m:sub>
+                            <m:r>
+                              <a:rPr lang="en-US" sz="2800" b="0" i="1" smtClean="0">
+                                <a:latin typeface="Cambria Math" charset="0"/>
+                              </a:rPr>
+                              <m:t>𝑖</m:t>
+                            </m:r>
+                          </m:sub>
+                        </m:sSub>
+                      </m:oMath>
+                    </m:oMathPara>
+                  </a14:m>
+                  <a:endParaRPr lang="en-US" sz="2800" dirty="0"/>
+                </a:p>
+              </p:txBody>
+            </p:sp>
+          </mc:Choice>
+          <mc:Fallback>
+            <p:sp>
+              <p:nvSpPr>
+                <p:cNvPr id="16" name="TextBox 15"/>
+                <p:cNvSpPr txBox="1">
+                  <a:spLocks noRot="1" noChangeAspect="1" noMove="1" noResize="1" noEditPoints="1" noAdjustHandles="1" noChangeArrowheads="1" noChangeShapeType="1" noTextEdit="1"/>
+                </p:cNvSpPr>
+                <p:nvPr/>
+              </p:nvSpPr>
+              <p:spPr>
+                <a:xfrm>
+                  <a:off x="6163916" y="3419549"/>
+                  <a:ext cx="364331" cy="430887"/>
+                </a:xfrm>
+                <a:prstGeom prst="rect">
+                  <a:avLst/>
+                </a:prstGeom>
+                <a:blipFill rotWithShape="0">
+                  <a:blip r:embed="rId5"/>
+                  <a:stretch>
+                    <a:fillRect/>
+                  </a:stretch>
+                </a:blipFill>
+              </p:spPr>
+              <p:txBody>
+                <a:bodyPr/>
+                <a:lstStyle/>
+                <a:p>
+                  <a:r>
+                    <a:rPr lang="en-US">
+                      <a:noFill/>
+                    </a:rPr>
+                    <a:t> </a:t>
+                  </a:r>
+                </a:p>
+              </p:txBody>
+            </p:sp>
+          </mc:Fallback>
+        </mc:AlternateContent>
+        <p:pic>
+          <p:nvPicPr>
+            <p:cNvPr id="17" name="Picture 16"/>
+            <p:cNvPicPr>
+              <a:picLocks noChangeAspect="1"/>
+            </p:cNvPicPr>
+            <p:nvPr/>
+          </p:nvPicPr>
+          <p:blipFill>
+            <a:blip r:embed="rId6">
+              <a:clrChange>
+                <a:clrFrom>
+                  <a:srgbClr val="FFFFFF"/>
+                </a:clrFrom>
+                <a:clrTo>
+                  <a:srgbClr val="FFFFFF">
+                    <a:alpha val="0"/>
+                  </a:srgbClr>
+                </a:clrTo>
+              </a:clrChange>
+            </a:blip>
+            <a:stretch>
+              <a:fillRect/>
+            </a:stretch>
+          </p:blipFill>
+          <p:spPr>
+            <a:xfrm>
+              <a:off x="6995638" y="2610322"/>
+              <a:ext cx="182880" cy="182880"/>
+            </a:xfrm>
+            <a:prstGeom prst="rect">
+              <a:avLst/>
+            </a:prstGeom>
+          </p:spPr>
+        </p:pic>
+        <p:cxnSp>
+          <p:nvCxnSpPr>
+            <p:cNvPr id="19" name="Straight Arrow Connector 18"/>
+            <p:cNvCxnSpPr/>
+            <p:nvPr/>
+          </p:nvCxnSpPr>
+          <p:spPr>
+            <a:xfrm rot="19582845" flipV="1">
+              <a:off x="6916428" y="2121925"/>
+              <a:ext cx="0" cy="640081"/>
+            </a:xfrm>
+            <a:prstGeom prst="straightConnector1">
+              <a:avLst/>
+            </a:prstGeom>
+            <a:ln w="38100" cmpd="sng">
+              <a:solidFill>
+                <a:srgbClr val="000000"/>
+              </a:solidFill>
+              <a:headEnd type="none"/>
+              <a:tailEnd type="stealth"/>
+            </a:ln>
+            <a:effectLst/>
+          </p:spPr>
+          <p:style>
+            <a:lnRef idx="2">
+              <a:schemeClr val="accent1"/>
+            </a:lnRef>
+            <a:fillRef idx="0">
+              <a:schemeClr val="accent1"/>
+            </a:fillRef>
+            <a:effectRef idx="1">
+              <a:schemeClr val="accent1"/>
+            </a:effectRef>
+            <a:fontRef idx="minor">
+              <a:schemeClr val="tx1"/>
+            </a:fontRef>
+          </p:style>
+        </p:cxnSp>
+        <p:cxnSp>
+          <p:nvCxnSpPr>
+            <p:cNvPr id="20" name="Straight Arrow Connector 19"/>
+            <p:cNvCxnSpPr/>
+            <p:nvPr/>
+          </p:nvCxnSpPr>
+          <p:spPr>
+            <a:xfrm rot="19582845">
+              <a:off x="7031957" y="2528627"/>
+              <a:ext cx="640080" cy="0"/>
+            </a:xfrm>
+            <a:prstGeom prst="straightConnector1">
+              <a:avLst/>
+            </a:prstGeom>
+            <a:ln w="38100" cmpd="sng">
+              <a:solidFill>
+                <a:srgbClr val="000000"/>
+              </a:solidFill>
+              <a:headEnd type="none"/>
+              <a:tailEnd type="stealth"/>
+            </a:ln>
+            <a:effectLst/>
+          </p:spPr>
+          <p:style>
+            <a:lnRef idx="2">
+              <a:schemeClr val="accent1"/>
+            </a:lnRef>
+            <a:fillRef idx="0">
+              <a:schemeClr val="accent1"/>
+            </a:fillRef>
+            <a:effectRef idx="1">
+              <a:schemeClr val="accent1"/>
+            </a:effectRef>
+            <a:fontRef idx="minor">
+              <a:schemeClr val="tx1"/>
+            </a:fontRef>
+          </p:style>
+        </p:cxnSp>
+        <p:cxnSp>
+          <p:nvCxnSpPr>
+            <p:cNvPr id="21" name="Straight Arrow Connector 20"/>
+            <p:cNvCxnSpPr/>
+            <p:nvPr/>
+          </p:nvCxnSpPr>
+          <p:spPr>
+            <a:xfrm rot="19582845">
+              <a:off x="7176985" y="2583907"/>
+              <a:ext cx="284477" cy="433133"/>
+            </a:xfrm>
+            <a:prstGeom prst="straightConnector1">
+              <a:avLst/>
+            </a:prstGeom>
+            <a:ln w="38100" cmpd="sng">
+              <a:solidFill>
+                <a:srgbClr val="000000"/>
+              </a:solidFill>
+              <a:headEnd type="none"/>
+              <a:tailEnd type="stealth"/>
+            </a:ln>
+            <a:effectLst/>
+          </p:spPr>
+          <p:style>
+            <a:lnRef idx="2">
+              <a:schemeClr val="accent1"/>
+            </a:lnRef>
+            <a:fillRef idx="0">
+              <a:schemeClr val="accent1"/>
+            </a:fillRef>
+            <a:effectRef idx="1">
+              <a:schemeClr val="accent1"/>
+            </a:effectRef>
+            <a:fontRef idx="minor">
+              <a:schemeClr val="tx1"/>
+            </a:fontRef>
+          </p:style>
+        </p:cxnSp>
+        <p:cxnSp>
+          <p:nvCxnSpPr>
+            <p:cNvPr id="22" name="Straight Arrow Connector 21"/>
+            <p:cNvCxnSpPr/>
+            <p:nvPr/>
+          </p:nvCxnSpPr>
+          <p:spPr>
+            <a:xfrm rot="18632697" flipV="1">
+              <a:off x="6195851" y="3636207"/>
+              <a:ext cx="0" cy="640081"/>
+            </a:xfrm>
+            <a:prstGeom prst="straightConnector1">
+              <a:avLst/>
+            </a:prstGeom>
+            <a:ln w="38100" cmpd="sng">
+              <a:solidFill>
+                <a:srgbClr val="000000"/>
+              </a:solidFill>
+              <a:headEnd type="none"/>
+              <a:tailEnd type="stealth"/>
+            </a:ln>
+            <a:effectLst/>
+          </p:spPr>
+          <p:style>
+            <a:lnRef idx="2">
+              <a:schemeClr val="accent1"/>
+            </a:lnRef>
+            <a:fillRef idx="0">
+              <a:schemeClr val="accent1"/>
+            </a:fillRef>
+            <a:effectRef idx="1">
+              <a:schemeClr val="accent1"/>
+            </a:effectRef>
+            <a:fontRef idx="minor">
+              <a:schemeClr val="tx1"/>
+            </a:fontRef>
+          </p:style>
+        </p:cxnSp>
+        <p:cxnSp>
+          <p:nvCxnSpPr>
+            <p:cNvPr id="23" name="Straight Arrow Connector 22"/>
+            <p:cNvCxnSpPr/>
+            <p:nvPr/>
+          </p:nvCxnSpPr>
+          <p:spPr>
+            <a:xfrm rot="18632697">
+              <a:off x="6318493" y="3920757"/>
+              <a:ext cx="640080" cy="0"/>
+            </a:xfrm>
+            <a:prstGeom prst="straightConnector1">
+              <a:avLst/>
+            </a:prstGeom>
+            <a:ln w="38100" cmpd="sng">
+              <a:solidFill>
+                <a:srgbClr val="000000"/>
+              </a:solidFill>
+              <a:headEnd type="none"/>
+              <a:tailEnd type="stealth"/>
+            </a:ln>
+            <a:effectLst/>
+          </p:spPr>
+          <p:style>
+            <a:lnRef idx="2">
+              <a:schemeClr val="accent1"/>
+            </a:lnRef>
+            <a:fillRef idx="0">
+              <a:schemeClr val="accent1"/>
+            </a:fillRef>
+            <a:effectRef idx="1">
+              <a:schemeClr val="accent1"/>
+            </a:effectRef>
+            <a:fontRef idx="minor">
+              <a:schemeClr val="tx1"/>
+            </a:fontRef>
+          </p:style>
+        </p:cxnSp>
+        <p:cxnSp>
+          <p:nvCxnSpPr>
+            <p:cNvPr id="24" name="Straight Arrow Connector 23"/>
+            <p:cNvCxnSpPr/>
+            <p:nvPr/>
+          </p:nvCxnSpPr>
+          <p:spPr>
+            <a:xfrm rot="18632697">
+              <a:off x="6538943" y="3974655"/>
+              <a:ext cx="284480" cy="433132"/>
+            </a:xfrm>
+            <a:prstGeom prst="straightConnector1">
+              <a:avLst/>
+            </a:prstGeom>
+            <a:ln w="38100" cmpd="sng">
+              <a:solidFill>
+                <a:srgbClr val="000000"/>
+              </a:solidFill>
+              <a:headEnd type="none"/>
+              <a:tailEnd type="stealth"/>
+            </a:ln>
+            <a:effectLst/>
+          </p:spPr>
+          <p:style>
+            <a:lnRef idx="2">
+              <a:schemeClr val="accent1"/>
+            </a:lnRef>
+            <a:fillRef idx="0">
+              <a:schemeClr val="accent1"/>
+            </a:fillRef>
+            <a:effectRef idx="1">
+              <a:schemeClr val="accent1"/>
+            </a:effectRef>
+            <a:fontRef idx="minor">
+              <a:schemeClr val="tx1"/>
+            </a:fontRef>
+          </p:style>
+        </p:cxnSp>
+        <mc:AlternateContent xmlns:mc="http://schemas.openxmlformats.org/markup-compatibility/2006">
+          <mc:Choice xmlns:a14="http://schemas.microsoft.com/office/drawing/2010/main" Requires="a14">
+            <p:sp>
+              <p:nvSpPr>
+                <p:cNvPr id="26" name="TextBox 25"/>
+                <p:cNvSpPr txBox="1"/>
+                <p:nvPr/>
+              </p:nvSpPr>
+              <p:spPr>
+                <a:xfrm>
+                  <a:off x="5873701" y="4476397"/>
+                  <a:ext cx="565348" cy="472950"/>
+                </a:xfrm>
+                <a:prstGeom prst="rect">
+                  <a:avLst/>
+                </a:prstGeom>
+                <a:noFill/>
+              </p:spPr>
+              <p:txBody>
+                <a:bodyPr wrap="none" lIns="0" tIns="0" rIns="0" bIns="0" rtlCol="0">
+                  <a:spAutoFit/>
+                </a:bodyPr>
+                <a:lstStyle/>
+                <a:p>
+                  <a:pPr/>
+                  <a14:m>
+                    <m:oMathPara xmlns:m="http://schemas.openxmlformats.org/officeDocument/2006/math">
+                      <m:oMathParaPr>
+                        <m:jc m:val="centerGroup"/>
+                      </m:oMathParaPr>
+                      <m:oMath xmlns:m="http://schemas.openxmlformats.org/officeDocument/2006/math">
+                        <m:sSub>
+                          <m:sSubPr>
+                            <m:ctrlPr>
+                              <a:rPr lang="en-US" sz="2800" i="1" smtClean="0">
+                                <a:latin typeface="Cambria Math" charset="0"/>
+                              </a:rPr>
+                            </m:ctrlPr>
+                          </m:sSubPr>
+                          <m:e>
+                            <m:r>
+                              <a:rPr lang="en-US" sz="2800" b="0" i="1" smtClean="0">
+                                <a:latin typeface="Cambria Math" charset="0"/>
+                              </a:rPr>
+                              <m:t>𝑂</m:t>
+                            </m:r>
+                          </m:e>
+                          <m:sub>
+                            <m:sSub>
+                              <m:sSubPr>
+                                <m:ctrlPr>
+                                  <a:rPr lang="en-US" sz="2800" i="1">
+                                    <a:latin typeface="Cambria Math" charset="0"/>
+                                  </a:rPr>
+                                </m:ctrlPr>
+                              </m:sSubPr>
+                              <m:e>
+                                <m:r>
+                                  <a:rPr lang="en-US" sz="2800" i="1">
+                                    <a:latin typeface="Cambria Math" charset="0"/>
+                                  </a:rPr>
+                                  <m:t>𝒥</m:t>
+                                </m:r>
+                              </m:e>
+                              <m:sub>
+                                <m:r>
+                                  <a:rPr lang="en-US" sz="2800" i="1">
+                                    <a:latin typeface="Cambria Math" charset="0"/>
+                                  </a:rPr>
+                                  <m:t>𝑖</m:t>
+                                </m:r>
+                              </m:sub>
+                            </m:sSub>
+                          </m:sub>
+                        </m:sSub>
+                      </m:oMath>
+                    </m:oMathPara>
+                  </a14:m>
+                  <a:endParaRPr lang="en-US" sz="2800" dirty="0"/>
+                </a:p>
+              </p:txBody>
+            </p:sp>
+          </mc:Choice>
+          <mc:Fallback>
+            <p:sp>
+              <p:nvSpPr>
+                <p:cNvPr id="26" name="TextBox 25"/>
+                <p:cNvSpPr txBox="1">
+                  <a:spLocks noRot="1" noChangeAspect="1" noMove="1" noResize="1" noEditPoints="1" noAdjustHandles="1" noChangeArrowheads="1" noChangeShapeType="1" noTextEdit="1"/>
+                </p:cNvSpPr>
+                <p:nvPr/>
+              </p:nvSpPr>
+              <p:spPr>
+                <a:xfrm>
+                  <a:off x="5873701" y="4476397"/>
+                  <a:ext cx="565348" cy="472950"/>
+                </a:xfrm>
+                <a:prstGeom prst="rect">
+                  <a:avLst/>
+                </a:prstGeom>
+                <a:blipFill rotWithShape="0">
+                  <a:blip r:embed="rId7"/>
+                  <a:stretch>
+                    <a:fillRect/>
+                  </a:stretch>
+                </a:blipFill>
+              </p:spPr>
+              <p:txBody>
+                <a:bodyPr/>
+                <a:lstStyle/>
+                <a:p>
+                  <a:r>
+                    <a:rPr lang="en-US">
+                      <a:noFill/>
+                    </a:rPr>
+                    <a:t> </a:t>
+                  </a:r>
+                </a:p>
+              </p:txBody>
+            </p:sp>
+          </mc:Fallback>
+        </mc:AlternateContent>
+        <p:cxnSp>
+          <p:nvCxnSpPr>
+            <p:cNvPr id="27" name="Straight Arrow Connector 26"/>
+            <p:cNvCxnSpPr/>
+            <p:nvPr/>
+          </p:nvCxnSpPr>
+          <p:spPr>
+            <a:xfrm flipV="1">
+              <a:off x="6232684" y="4191221"/>
+              <a:ext cx="170483" cy="409767"/>
+            </a:xfrm>
+            <a:prstGeom prst="straightConnector1">
+              <a:avLst/>
+            </a:prstGeom>
+            <a:ln w="9525" cmpd="sng">
+              <a:solidFill>
+                <a:schemeClr val="tx1"/>
+              </a:solidFill>
+              <a:prstDash val="solid"/>
+              <a:headEnd type="none" w="med" len="med"/>
+              <a:tailEnd type="none" w="med" len="med"/>
+            </a:ln>
+            <a:effectLst/>
+          </p:spPr>
+          <p:style>
+            <a:lnRef idx="2">
+              <a:schemeClr val="accent1"/>
+            </a:lnRef>
+            <a:fillRef idx="0">
+              <a:schemeClr val="accent1"/>
+            </a:fillRef>
+            <a:effectRef idx="1">
+              <a:schemeClr val="accent1"/>
+            </a:effectRef>
+            <a:fontRef idx="minor">
+              <a:schemeClr val="tx1"/>
+            </a:fontRef>
+          </p:style>
+        </p:cxnSp>
+        <p:sp>
+          <p:nvSpPr>
+            <p:cNvPr id="28" name="TextBox 27"/>
+            <p:cNvSpPr txBox="1"/>
+            <p:nvPr/>
+          </p:nvSpPr>
+          <p:spPr>
+            <a:xfrm>
+              <a:off x="3932408" y="2474939"/>
+              <a:ext cx="1394412" cy="923330"/>
+            </a:xfrm>
+            <a:prstGeom prst="rect">
+              <a:avLst/>
+            </a:prstGeom>
+            <a:noFill/>
+          </p:spPr>
+          <p:txBody>
+            <a:bodyPr wrap="square" rtlCol="0">
+              <a:spAutoFit/>
+            </a:bodyPr>
+            <a:lstStyle/>
+            <a:p>
+              <a:pPr algn="ctr"/>
+              <a:r>
+                <a:rPr lang="en-US" dirty="0">
+                  <a:latin typeface="Helvetica Light" charset="0"/>
+                  <a:ea typeface="Helvetica Light" charset="0"/>
+                  <a:cs typeface="Helvetica Light" charset="0"/>
+                </a:rPr>
+                <a:t>r</a:t>
+              </a:r>
+              <a:r>
+                <a:rPr lang="en-US" dirty="0" smtClean="0">
+                  <a:latin typeface="Helvetica Light" charset="0"/>
+                  <a:ea typeface="Helvetica Light" charset="0"/>
+                  <a:cs typeface="Helvetica Light" charset="0"/>
+                </a:rPr>
+                <a:t>otation </a:t>
+              </a:r>
+            </a:p>
+            <a:p>
+              <a:pPr algn="ctr"/>
+              <a:r>
+                <a:rPr lang="en-US" dirty="0" smtClean="0">
+                  <a:latin typeface="Helvetica Light" charset="0"/>
+                  <a:ea typeface="Helvetica Light" charset="0"/>
+                  <a:cs typeface="Helvetica Light" charset="0"/>
+                </a:rPr>
+                <a:t>translation axis</a:t>
+              </a:r>
+              <a:endParaRPr lang="en-US" dirty="0">
+                <a:latin typeface="Helvetica Light" charset="0"/>
+                <a:ea typeface="Helvetica Light" charset="0"/>
+                <a:cs typeface="Helvetica Light" charset="0"/>
+              </a:endParaRPr>
+            </a:p>
+          </p:txBody>
+        </p:sp>
+        <p:sp>
+          <p:nvSpPr>
+            <p:cNvPr id="29" name="TextBox 28"/>
+            <p:cNvSpPr txBox="1"/>
+            <p:nvPr/>
+          </p:nvSpPr>
+          <p:spPr>
+            <a:xfrm>
+              <a:off x="6120855" y="1470407"/>
+              <a:ext cx="1863371" cy="369332"/>
+            </a:xfrm>
+            <a:prstGeom prst="rect">
+              <a:avLst/>
+            </a:prstGeom>
+            <a:noFill/>
+          </p:spPr>
+          <p:txBody>
+            <a:bodyPr wrap="square" rtlCol="0">
+              <a:spAutoFit/>
+            </a:bodyPr>
+            <a:lstStyle/>
+            <a:p>
+              <a:pPr algn="ctr"/>
+              <a:r>
+                <a:rPr lang="en-US" dirty="0">
+                  <a:latin typeface="Helvetica Light" charset="0"/>
+                  <a:ea typeface="Helvetica Light" charset="0"/>
+                  <a:cs typeface="Helvetica Light" charset="0"/>
+                </a:rPr>
+                <a:t>c</a:t>
+              </a:r>
+              <a:r>
+                <a:rPr lang="en-US" dirty="0" smtClean="0">
+                  <a:latin typeface="Helvetica Light" charset="0"/>
+                  <a:ea typeface="Helvetica Light" charset="0"/>
+                  <a:cs typeface="Helvetica Light" charset="0"/>
+                </a:rPr>
+                <a:t>enter-of-mass</a:t>
+              </a:r>
+            </a:p>
+          </p:txBody>
+        </p:sp>
+        <p:cxnSp>
+          <p:nvCxnSpPr>
+            <p:cNvPr id="30" name="Straight Arrow Connector 29"/>
+            <p:cNvCxnSpPr/>
+            <p:nvPr/>
+          </p:nvCxnSpPr>
+          <p:spPr>
+            <a:xfrm flipV="1">
+              <a:off x="7087078" y="1803586"/>
+              <a:ext cx="118684" cy="806736"/>
+            </a:xfrm>
+            <a:prstGeom prst="straightConnector1">
+              <a:avLst/>
+            </a:prstGeom>
+            <a:ln w="9525" cmpd="sng">
+              <a:solidFill>
+                <a:schemeClr val="tx1"/>
+              </a:solidFill>
+              <a:prstDash val="solid"/>
+              <a:headEnd type="none" w="med" len="med"/>
+              <a:tailEnd type="none" w="med" len="med"/>
+            </a:ln>
+            <a:effectLst/>
+          </p:spPr>
+          <p:style>
+            <a:lnRef idx="2">
+              <a:schemeClr val="accent1"/>
+            </a:lnRef>
+            <a:fillRef idx="0">
+              <a:schemeClr val="accent1"/>
+            </a:fillRef>
+            <a:effectRef idx="1">
+              <a:schemeClr val="accent1"/>
+            </a:effectRef>
+            <a:fontRef idx="minor">
+              <a:schemeClr val="tx1"/>
+            </a:fontRef>
+          </p:style>
+        </p:cxnSp>
+        <mc:AlternateContent xmlns:mc="http://schemas.openxmlformats.org/markup-compatibility/2006">
+          <mc:Choice xmlns:a14="http://schemas.microsoft.com/office/drawing/2010/main" Requires="a14">
+            <p:sp>
+              <p:nvSpPr>
+                <p:cNvPr id="31" name="TextBox 30"/>
+                <p:cNvSpPr txBox="1"/>
+                <p:nvPr/>
+              </p:nvSpPr>
+              <p:spPr>
+                <a:xfrm>
+                  <a:off x="8256295" y="3180345"/>
+                  <a:ext cx="675382" cy="369332"/>
+                </a:xfrm>
+                <a:prstGeom prst="rect">
+                  <a:avLst/>
+                </a:prstGeom>
+                <a:noFill/>
+              </p:spPr>
+              <p:txBody>
+                <a:bodyPr wrap="square" rtlCol="0">
+                  <a:spAutoFit/>
+                </a:bodyPr>
+                <a:lstStyle/>
+                <a:p>
+                  <a:r>
+                    <a:rPr lang="en-US" dirty="0" smtClean="0">
+                      <a:latin typeface="Helvetica Light" charset="0"/>
+                      <a:ea typeface="Helvetica Light" charset="0"/>
+                      <a:cs typeface="Helvetica Light" charset="0"/>
+                    </a:rPr>
+                    <a:t>link </a:t>
+                  </a:r>
+                  <a14:m>
+                    <m:oMath xmlns:m="http://schemas.openxmlformats.org/officeDocument/2006/math">
+                      <m:r>
+                        <a:rPr lang="en-US" b="0" i="1" smtClean="0">
+                          <a:latin typeface="Cambria Math" charset="0"/>
+                          <a:ea typeface="Helvetica Light" charset="0"/>
+                          <a:cs typeface="Helvetica Light" charset="0"/>
+                        </a:rPr>
+                        <m:t>𝑖</m:t>
+                      </m:r>
+                    </m:oMath>
+                  </a14:m>
+                  <a:endParaRPr lang="en-US" dirty="0" smtClean="0">
+                    <a:latin typeface="Helvetica Light" charset="0"/>
+                    <a:ea typeface="Helvetica Light" charset="0"/>
+                    <a:cs typeface="Helvetica Light" charset="0"/>
+                  </a:endParaRPr>
+                </a:p>
+              </p:txBody>
+            </p:sp>
+          </mc:Choice>
+          <mc:Fallback>
+            <p:sp>
+              <p:nvSpPr>
+                <p:cNvPr id="31" name="TextBox 30"/>
+                <p:cNvSpPr txBox="1">
+                  <a:spLocks noRot="1" noChangeAspect="1" noMove="1" noResize="1" noEditPoints="1" noAdjustHandles="1" noChangeArrowheads="1" noChangeShapeType="1" noTextEdit="1"/>
+                </p:cNvSpPr>
+                <p:nvPr/>
+              </p:nvSpPr>
+              <p:spPr>
+                <a:xfrm>
+                  <a:off x="8256295" y="3180345"/>
+                  <a:ext cx="675382" cy="369332"/>
+                </a:xfrm>
+                <a:prstGeom prst="rect">
+                  <a:avLst/>
+                </a:prstGeom>
+                <a:blipFill rotWithShape="0">
+                  <a:blip r:embed="rId8"/>
+                  <a:stretch>
+                    <a:fillRect l="-7207" t="-8333" b="-28333"/>
+                  </a:stretch>
+                </a:blipFill>
+              </p:spPr>
+              <p:txBody>
+                <a:bodyPr/>
+                <a:lstStyle/>
+                <a:p>
+                  <a:r>
+                    <a:rPr lang="en-US">
+                      <a:noFill/>
+                    </a:rPr>
+                    <a:t> </a:t>
+                  </a:r>
+                </a:p>
+              </p:txBody>
+            </p:sp>
+          </mc:Fallback>
+        </mc:AlternateContent>
+        <mc:AlternateContent xmlns:mc="http://schemas.openxmlformats.org/markup-compatibility/2006">
+          <mc:Choice xmlns:a14="http://schemas.microsoft.com/office/drawing/2010/main" Requires="a14">
+            <p:sp>
+              <p:nvSpPr>
+                <p:cNvPr id="32" name="TextBox 31"/>
+                <p:cNvSpPr txBox="1"/>
+                <p:nvPr/>
+              </p:nvSpPr>
+              <p:spPr>
+                <a:xfrm>
+                  <a:off x="4953589" y="4041680"/>
+                  <a:ext cx="1863371" cy="369332"/>
+                </a:xfrm>
+                <a:prstGeom prst="rect">
+                  <a:avLst/>
+                </a:prstGeom>
+                <a:noFill/>
+              </p:spPr>
+              <p:txBody>
+                <a:bodyPr wrap="square" rtlCol="0">
+                  <a:spAutoFit/>
+                </a:bodyPr>
+                <a:lstStyle/>
+                <a:p>
+                  <a:r>
+                    <a:rPr lang="en-US" dirty="0" smtClean="0">
+                      <a:latin typeface="Helvetica Light" charset="0"/>
+                      <a:ea typeface="Helvetica Light" charset="0"/>
+                      <a:cs typeface="Helvetica Light" charset="0"/>
+                    </a:rPr>
+                    <a:t>joint </a:t>
+                  </a:r>
+                  <a14:m>
+                    <m:oMath xmlns:m="http://schemas.openxmlformats.org/officeDocument/2006/math">
+                      <m:r>
+                        <a:rPr lang="en-US" b="0" i="1" smtClean="0">
+                          <a:latin typeface="Cambria Math" charset="0"/>
+                          <a:ea typeface="Helvetica Light" charset="0"/>
+                          <a:cs typeface="Helvetica Light" charset="0"/>
+                        </a:rPr>
+                        <m:t>𝑖</m:t>
+                      </m:r>
+                    </m:oMath>
+                  </a14:m>
+                  <a:endParaRPr lang="en-US" dirty="0" smtClean="0">
+                    <a:latin typeface="Helvetica Light" charset="0"/>
+                    <a:ea typeface="Helvetica Light" charset="0"/>
+                    <a:cs typeface="Helvetica Light" charset="0"/>
+                  </a:endParaRPr>
+                </a:p>
+              </p:txBody>
+            </p:sp>
+          </mc:Choice>
+          <mc:Fallback>
+            <p:sp>
+              <p:nvSpPr>
+                <p:cNvPr id="32" name="TextBox 31"/>
+                <p:cNvSpPr txBox="1">
+                  <a:spLocks noRot="1" noChangeAspect="1" noMove="1" noResize="1" noEditPoints="1" noAdjustHandles="1" noChangeArrowheads="1" noChangeShapeType="1" noTextEdit="1"/>
+                </p:cNvSpPr>
+                <p:nvPr/>
+              </p:nvSpPr>
+              <p:spPr>
+                <a:xfrm>
+                  <a:off x="4953589" y="4041680"/>
+                  <a:ext cx="1863371" cy="369332"/>
+                </a:xfrm>
+                <a:prstGeom prst="rect">
+                  <a:avLst/>
+                </a:prstGeom>
+                <a:blipFill rotWithShape="0">
+                  <a:blip r:embed="rId9"/>
+                  <a:stretch>
+                    <a:fillRect l="-2951" t="-6557" b="-26230"/>
+                  </a:stretch>
+                </a:blipFill>
+              </p:spPr>
+              <p:txBody>
+                <a:bodyPr/>
+                <a:lstStyle/>
+                <a:p>
+                  <a:r>
+                    <a:rPr lang="en-US">
+                      <a:noFill/>
+                    </a:rPr>
+                    <a:t> </a:t>
+                  </a:r>
+                </a:p>
+              </p:txBody>
+            </p:sp>
+          </mc:Fallback>
+        </mc:AlternateContent>
+        <p:cxnSp>
+          <p:nvCxnSpPr>
+            <p:cNvPr id="33" name="Straight Arrow Connector 32"/>
+            <p:cNvCxnSpPr/>
+            <p:nvPr/>
+          </p:nvCxnSpPr>
+          <p:spPr>
+            <a:xfrm flipV="1">
+              <a:off x="5673617" y="4163955"/>
+              <a:ext cx="270407" cy="66470"/>
+            </a:xfrm>
+            <a:prstGeom prst="straightConnector1">
+              <a:avLst/>
+            </a:prstGeom>
+            <a:ln w="9525" cmpd="sng">
+              <a:solidFill>
+                <a:schemeClr val="tx1"/>
+              </a:solidFill>
+              <a:prstDash val="solid"/>
+              <a:headEnd type="none" w="med" len="med"/>
+              <a:tailEnd type="none" w="med" len="med"/>
+            </a:ln>
+            <a:effectLst/>
+          </p:spPr>
+          <p:style>
+            <a:lnRef idx="2">
+              <a:schemeClr val="accent1"/>
+            </a:lnRef>
+            <a:fillRef idx="0">
+              <a:schemeClr val="accent1"/>
+            </a:fillRef>
+            <a:effectRef idx="1">
+              <a:schemeClr val="accent1"/>
+            </a:effectRef>
+            <a:fontRef idx="minor">
+              <a:schemeClr val="tx1"/>
+            </a:fontRef>
+          </p:style>
+        </p:cxnSp>
+        <p:cxnSp>
+          <p:nvCxnSpPr>
+            <p:cNvPr id="34" name="Straight Arrow Connector 33"/>
+            <p:cNvCxnSpPr/>
+            <p:nvPr/>
+          </p:nvCxnSpPr>
+          <p:spPr>
+            <a:xfrm>
+              <a:off x="8285602" y="3107673"/>
+              <a:ext cx="160936" cy="97038"/>
+            </a:xfrm>
+            <a:prstGeom prst="straightConnector1">
+              <a:avLst/>
+            </a:prstGeom>
+            <a:ln w="9525" cmpd="sng">
+              <a:solidFill>
+                <a:schemeClr val="tx1"/>
+              </a:solidFill>
+              <a:prstDash val="solid"/>
+              <a:headEnd type="none" w="med" len="med"/>
+              <a:tailEnd type="none" w="med" len="med"/>
+            </a:ln>
+            <a:effectLst/>
+          </p:spPr>
+          <p:style>
+            <a:lnRef idx="2">
+              <a:schemeClr val="accent1"/>
+            </a:lnRef>
+            <a:fillRef idx="0">
+              <a:schemeClr val="accent1"/>
+            </a:fillRef>
+            <a:effectRef idx="1">
+              <a:schemeClr val="accent1"/>
+            </a:effectRef>
+            <a:fontRef idx="minor">
+              <a:schemeClr val="tx1"/>
+            </a:fontRef>
+          </p:style>
+        </p:cxnSp>
+        <p:cxnSp>
+          <p:nvCxnSpPr>
+            <p:cNvPr id="35" name="Straight Arrow Connector 34"/>
+            <p:cNvCxnSpPr/>
+            <p:nvPr/>
+          </p:nvCxnSpPr>
+          <p:spPr>
+            <a:xfrm flipH="1" flipV="1">
+              <a:off x="7191594" y="2881798"/>
+              <a:ext cx="901987" cy="1719192"/>
+            </a:xfrm>
+            <a:prstGeom prst="straightConnector1">
+              <a:avLst/>
+            </a:prstGeom>
+            <a:ln w="19050" cmpd="sng">
+              <a:solidFill>
+                <a:schemeClr val="tx1"/>
+              </a:solidFill>
+              <a:headEnd type="none"/>
+              <a:tailEnd type="stealth"/>
+            </a:ln>
+            <a:effectLst/>
+          </p:spPr>
+          <p:style>
+            <a:lnRef idx="2">
+              <a:schemeClr val="accent1"/>
+            </a:lnRef>
+            <a:fillRef idx="0">
+              <a:schemeClr val="accent1"/>
+            </a:fillRef>
+            <a:effectRef idx="1">
+              <a:schemeClr val="accent1"/>
+            </a:effectRef>
+            <a:fontRef idx="minor">
+              <a:schemeClr val="tx1"/>
+            </a:fontRef>
+          </p:style>
+        </p:cxnSp>
+        <mc:AlternateContent xmlns:mc="http://schemas.openxmlformats.org/markup-compatibility/2006">
+          <mc:Choice xmlns:a14="http://schemas.microsoft.com/office/drawing/2010/main" Requires="a14">
+            <p:sp>
+              <p:nvSpPr>
+                <p:cNvPr id="36" name="TextBox 35"/>
+                <p:cNvSpPr txBox="1"/>
+                <p:nvPr/>
+              </p:nvSpPr>
+              <p:spPr>
+                <a:xfrm>
+                  <a:off x="7297177" y="3656233"/>
+                  <a:ext cx="471155" cy="472950"/>
+                </a:xfrm>
+                <a:prstGeom prst="rect">
+                  <a:avLst/>
+                </a:prstGeom>
+                <a:noFill/>
+              </p:spPr>
+              <p:txBody>
+                <a:bodyPr wrap="none" lIns="0" tIns="0" rIns="0" bIns="0" rtlCol="0">
+                  <a:spAutoFit/>
+                </a:bodyPr>
+                <a:lstStyle/>
+                <a:p>
+                  <a:pPr/>
+                  <a14:m>
+                    <m:oMathPara xmlns:m="http://schemas.openxmlformats.org/officeDocument/2006/math">
+                      <m:oMathParaPr>
+                        <m:jc m:val="centerGroup"/>
+                      </m:oMathParaPr>
+                      <m:oMath xmlns:m="http://schemas.openxmlformats.org/officeDocument/2006/math">
+                        <m:sSub>
+                          <m:sSubPr>
+                            <m:ctrlPr>
+                              <a:rPr lang="en-US" sz="2800" b="0" i="1" smtClean="0">
+                                <a:latin typeface="Cambria Math" charset="0"/>
+                              </a:rPr>
+                            </m:ctrlPr>
+                          </m:sSubPr>
+                          <m:e>
+                            <m:acc>
+                              <m:accPr>
+                                <m:chr m:val="⃗"/>
+                                <m:ctrlPr>
+                                  <a:rPr lang="en-US" sz="2800" i="1" smtClean="0">
+                                    <a:latin typeface="Cambria Math" charset="0"/>
+                                  </a:rPr>
+                                </m:ctrlPr>
+                              </m:accPr>
+                              <m:e>
+                                <m:r>
+                                  <a:rPr lang="en-US" sz="2800" b="0" i="1" smtClean="0">
+                                    <a:latin typeface="Cambria Math" charset="0"/>
+                                  </a:rPr>
+                                  <m:t>𝑟</m:t>
+                                </m:r>
+                              </m:e>
+                            </m:acc>
+                          </m:e>
+                          <m:sub>
+                            <m:sSub>
+                              <m:sSubPr>
+                                <m:ctrlPr>
+                                  <a:rPr lang="en-US" sz="2800" i="1">
+                                    <a:latin typeface="Cambria Math" charset="0"/>
+                                  </a:rPr>
+                                </m:ctrlPr>
+                              </m:sSubPr>
+                              <m:e>
+                                <m:r>
+                                  <a:rPr lang="en-US" sz="2800" i="1">
+                                    <a:latin typeface="Cambria Math" charset="0"/>
+                                  </a:rPr>
+                                  <m:t>ℒ</m:t>
+                                </m:r>
+                              </m:e>
+                              <m:sub>
+                                <m:r>
+                                  <a:rPr lang="en-US" sz="2800" i="1">
+                                    <a:latin typeface="Cambria Math" charset="0"/>
+                                  </a:rPr>
+                                  <m:t>𝑖</m:t>
+                                </m:r>
+                              </m:sub>
+                            </m:sSub>
+                          </m:sub>
+                        </m:sSub>
+                      </m:oMath>
+                    </m:oMathPara>
+                  </a14:m>
+                  <a:endParaRPr lang="en-US" sz="2800" dirty="0"/>
+                </a:p>
+              </p:txBody>
+            </p:sp>
+          </mc:Choice>
+          <mc:Fallback>
+            <p:sp>
+              <p:nvSpPr>
+                <p:cNvPr id="36" name="TextBox 35"/>
+                <p:cNvSpPr txBox="1">
+                  <a:spLocks noRot="1" noChangeAspect="1" noMove="1" noResize="1" noEditPoints="1" noAdjustHandles="1" noChangeArrowheads="1" noChangeShapeType="1" noTextEdit="1"/>
+                </p:cNvSpPr>
+                <p:nvPr/>
+              </p:nvSpPr>
+              <p:spPr>
+                <a:xfrm>
+                  <a:off x="7297177" y="3656233"/>
+                  <a:ext cx="471155" cy="472950"/>
+                </a:xfrm>
+                <a:prstGeom prst="rect">
+                  <a:avLst/>
+                </a:prstGeom>
+                <a:blipFill rotWithShape="0">
+                  <a:blip r:embed="rId10"/>
+                  <a:stretch>
+                    <a:fillRect/>
+                  </a:stretch>
+                </a:blipFill>
+              </p:spPr>
+              <p:txBody>
+                <a:bodyPr/>
+                <a:lstStyle/>
+                <a:p>
+                  <a:r>
+                    <a:rPr lang="en-US">
+                      <a:noFill/>
+                    </a:rPr>
+                    <a:t> </a:t>
+                  </a:r>
+                </a:p>
+              </p:txBody>
+            </p:sp>
+          </mc:Fallback>
+        </mc:AlternateContent>
+        <p:cxnSp>
+          <p:nvCxnSpPr>
+            <p:cNvPr id="37" name="Straight Arrow Connector 36"/>
+            <p:cNvCxnSpPr>
+              <a:stCxn id="25" idx="0"/>
+            </p:cNvCxnSpPr>
+            <p:nvPr/>
+          </p:nvCxnSpPr>
+          <p:spPr>
+            <a:xfrm flipH="1" flipV="1">
+              <a:off x="6486236" y="4224020"/>
+              <a:ext cx="1570079" cy="473278"/>
+            </a:xfrm>
+            <a:prstGeom prst="straightConnector1">
+              <a:avLst/>
+            </a:prstGeom>
+            <a:ln w="19050" cmpd="sng">
+              <a:solidFill>
+                <a:schemeClr val="tx1"/>
+              </a:solidFill>
+              <a:headEnd type="none"/>
+              <a:tailEnd type="stealth"/>
+            </a:ln>
+            <a:effectLst/>
+          </p:spPr>
+          <p:style>
+            <a:lnRef idx="2">
+              <a:schemeClr val="accent1"/>
+            </a:lnRef>
+            <a:fillRef idx="0">
+              <a:schemeClr val="accent1"/>
+            </a:fillRef>
+            <a:effectRef idx="1">
+              <a:schemeClr val="accent1"/>
+            </a:effectRef>
+            <a:fontRef idx="minor">
+              <a:schemeClr val="tx1"/>
+            </a:fontRef>
+          </p:style>
+        </p:cxnSp>
+        <p:cxnSp>
+          <p:nvCxnSpPr>
+            <p:cNvPr id="39" name="Straight Arrow Connector 38"/>
+            <p:cNvCxnSpPr/>
+            <p:nvPr/>
+          </p:nvCxnSpPr>
+          <p:spPr>
+            <a:xfrm flipV="1">
+              <a:off x="5198892" y="2689443"/>
+              <a:ext cx="272763" cy="136663"/>
+            </a:xfrm>
+            <a:prstGeom prst="straightConnector1">
+              <a:avLst/>
+            </a:prstGeom>
+            <a:ln w="9525" cmpd="sng">
+              <a:solidFill>
+                <a:schemeClr val="tx1"/>
+              </a:solidFill>
+              <a:prstDash val="solid"/>
+              <a:headEnd type="none" w="med" len="med"/>
+              <a:tailEnd type="none" w="med" len="med"/>
+            </a:ln>
+            <a:effectLst/>
+          </p:spPr>
+          <p:style>
+            <a:lnRef idx="2">
+              <a:schemeClr val="accent1"/>
+            </a:lnRef>
+            <a:fillRef idx="0">
+              <a:schemeClr val="accent1"/>
+            </a:fillRef>
+            <a:effectRef idx="1">
+              <a:schemeClr val="accent1"/>
+            </a:effectRef>
+            <a:fontRef idx="minor">
+              <a:schemeClr val="tx1"/>
+            </a:fontRef>
+          </p:style>
+        </p:cxnSp>
+        <p:grpSp>
+          <p:nvGrpSpPr>
+            <p:cNvPr id="49" name="Group 48"/>
+            <p:cNvGrpSpPr/>
+            <p:nvPr/>
+          </p:nvGrpSpPr>
+          <p:grpSpPr>
+            <a:xfrm>
+              <a:off x="7890019" y="3791222"/>
+              <a:ext cx="1143567" cy="1511644"/>
+              <a:chOff x="8239961" y="3637312"/>
+              <a:chExt cx="1143567" cy="1511644"/>
+            </a:xfrm>
+          </p:grpSpPr>
+          <p:grpSp>
+            <p:nvGrpSpPr>
+              <p:cNvPr id="7" name="Group 6"/>
+              <p:cNvGrpSpPr/>
+              <p:nvPr/>
+            </p:nvGrpSpPr>
+            <p:grpSpPr>
+              <a:xfrm>
+                <a:off x="8469128" y="3637312"/>
+                <a:ext cx="914400" cy="1511644"/>
+                <a:chOff x="6756074" y="2093288"/>
+                <a:chExt cx="914400" cy="1511644"/>
+              </a:xfrm>
+            </p:grpSpPr>
+            <p:cxnSp>
+              <p:nvCxnSpPr>
+                <p:cNvPr id="11" name="Straight Arrow Connector 10"/>
+                <p:cNvCxnSpPr/>
+                <p:nvPr/>
+              </p:nvCxnSpPr>
+              <p:spPr>
+                <a:xfrm flipV="1">
+                  <a:off x="6763657" y="2093288"/>
+                  <a:ext cx="0" cy="914400"/>
+                </a:xfrm>
+                <a:prstGeom prst="straightConnector1">
+                  <a:avLst/>
+                </a:prstGeom>
+                <a:ln w="38100" cmpd="sng">
+                  <a:solidFill>
+                    <a:srgbClr val="000000"/>
+                  </a:solidFill>
+                  <a:headEnd type="none"/>
+                  <a:tailEnd type="stealth"/>
+                </a:ln>
+                <a:effectLst/>
+              </p:spPr>
+              <p:style>
+                <a:lnRef idx="2">
+                  <a:schemeClr val="accent1"/>
+                </a:lnRef>
+                <a:fillRef idx="0">
+                  <a:schemeClr val="accent1"/>
+                </a:fillRef>
+                <a:effectRef idx="1">
+                  <a:schemeClr val="accent1"/>
+                </a:effectRef>
+                <a:fontRef idx="minor">
+                  <a:schemeClr val="tx1"/>
+                </a:fontRef>
+              </p:style>
+            </p:cxnSp>
+            <p:cxnSp>
+              <p:nvCxnSpPr>
+                <p:cNvPr id="12" name="Straight Arrow Connector 11"/>
+                <p:cNvCxnSpPr/>
+                <p:nvPr/>
+              </p:nvCxnSpPr>
+              <p:spPr>
+                <a:xfrm>
+                  <a:off x="6756074" y="2998091"/>
+                  <a:ext cx="914400" cy="0"/>
+                </a:xfrm>
+                <a:prstGeom prst="straightConnector1">
+                  <a:avLst/>
+                </a:prstGeom>
+                <a:ln w="38100" cmpd="sng">
+                  <a:solidFill>
+                    <a:srgbClr val="000000"/>
+                  </a:solidFill>
+                  <a:headEnd type="none"/>
+                  <a:tailEnd type="stealth"/>
+                </a:ln>
+                <a:effectLst/>
+              </p:spPr>
+              <p:style>
+                <a:lnRef idx="2">
+                  <a:schemeClr val="accent1"/>
+                </a:lnRef>
+                <a:fillRef idx="0">
+                  <a:schemeClr val="accent1"/>
+                </a:fillRef>
+                <a:effectRef idx="1">
+                  <a:schemeClr val="accent1"/>
+                </a:effectRef>
+                <a:fontRef idx="minor">
+                  <a:schemeClr val="tx1"/>
+                </a:fontRef>
+              </p:style>
+            </p:cxnSp>
+            <p:cxnSp>
+              <p:nvCxnSpPr>
+                <p:cNvPr id="13" name="Straight Arrow Connector 12"/>
+                <p:cNvCxnSpPr/>
+                <p:nvPr/>
+              </p:nvCxnSpPr>
+              <p:spPr>
+                <a:xfrm>
+                  <a:off x="6756074" y="2986172"/>
+                  <a:ext cx="406400" cy="618760"/>
+                </a:xfrm>
+                <a:prstGeom prst="straightConnector1">
+                  <a:avLst/>
+                </a:prstGeom>
+                <a:ln w="38100" cmpd="sng">
+                  <a:solidFill>
+                    <a:srgbClr val="000000"/>
+                  </a:solidFill>
+                  <a:headEnd type="none"/>
+                  <a:tailEnd type="stealth"/>
+                </a:ln>
+                <a:effectLst/>
+              </p:spPr>
+              <p:style>
+                <a:lnRef idx="2">
+                  <a:schemeClr val="accent1"/>
+                </a:lnRef>
+                <a:fillRef idx="0">
+                  <a:schemeClr val="accent1"/>
+                </a:fillRef>
+                <a:effectRef idx="1">
+                  <a:schemeClr val="accent1"/>
+                </a:effectRef>
+                <a:fontRef idx="minor">
+                  <a:schemeClr val="tx1"/>
+                </a:fontRef>
+              </p:style>
+            </p:cxnSp>
+          </p:grpSp>
+          <p:pic>
+            <p:nvPicPr>
+              <p:cNvPr id="18" name="Picture 17"/>
+              <p:cNvPicPr>
+                <a:picLocks noChangeAspect="1"/>
+              </p:cNvPicPr>
+              <p:nvPr/>
+            </p:nvPicPr>
+            <p:blipFill>
+              <a:blip r:embed="rId11">
+                <a:extLst>
+                  <a:ext uri="{28A0092B-C50C-407E-A947-70E740481C1C}">
+                    <a14:useLocalDpi xmlns:a14="http://schemas.microsoft.com/office/drawing/2010/main" val="0"/>
+                  </a:ext>
+                </a:extLst>
+              </a:blip>
+              <a:stretch>
+                <a:fillRect/>
+              </a:stretch>
+            </p:blipFill>
+            <p:spPr>
+              <a:xfrm>
+                <a:off x="9066129" y="4702416"/>
+                <a:ext cx="259882" cy="274320"/>
+              </a:xfrm>
+              <a:prstGeom prst="rect">
+                <a:avLst/>
+              </a:prstGeom>
+            </p:spPr>
+          </p:pic>
+          <mc:AlternateContent xmlns:mc="http://schemas.openxmlformats.org/markup-compatibility/2006">
+            <mc:Choice xmlns:a14="http://schemas.microsoft.com/office/drawing/2010/main" Requires="a14">
+              <p:sp>
+                <p:nvSpPr>
+                  <p:cNvPr id="25" name="TextBox 24"/>
+                  <p:cNvSpPr txBox="1"/>
+                  <p:nvPr/>
+                </p:nvSpPr>
+                <p:spPr>
+                  <a:xfrm>
+                    <a:off x="8239961" y="4543388"/>
+                    <a:ext cx="332591" cy="430887"/>
+                  </a:xfrm>
+                  <a:prstGeom prst="rect">
+                    <a:avLst/>
+                  </a:prstGeom>
+                  <a:noFill/>
+                </p:spPr>
+                <p:txBody>
+                  <a:bodyPr wrap="none" lIns="0" tIns="0" rIns="0" bIns="0" rtlCol="0">
+                    <a:spAutoFit/>
+                  </a:bodyPr>
+                  <a:lstStyle/>
+                  <a:p>
+                    <a:pPr/>
+                    <a14:m>
+                      <m:oMathPara xmlns:m="http://schemas.openxmlformats.org/officeDocument/2006/math">
+                        <m:oMathParaPr>
+                          <m:jc m:val="centerGroup"/>
+                        </m:oMathParaPr>
+                        <m:oMath xmlns:m="http://schemas.openxmlformats.org/officeDocument/2006/math">
+                          <m:r>
+                            <a:rPr lang="en-US" sz="2800" b="0" i="1" smtClean="0">
+                              <a:latin typeface="Cambria Math" charset="0"/>
+                            </a:rPr>
+                            <m:t>𝑂</m:t>
+                          </m:r>
+                        </m:oMath>
+                      </m:oMathPara>
+                    </a14:m>
+                    <a:endParaRPr lang="en-US" sz="2800" dirty="0"/>
+                  </a:p>
+                </p:txBody>
+              </p:sp>
+            </mc:Choice>
+            <mc:Fallback>
+              <p:sp>
+                <p:nvSpPr>
+                  <p:cNvPr id="25" name="TextBox 24"/>
+                  <p:cNvSpPr txBox="1">
+                    <a:spLocks noRot="1" noChangeAspect="1" noMove="1" noResize="1" noEditPoints="1" noAdjustHandles="1" noChangeArrowheads="1" noChangeShapeType="1" noTextEdit="1"/>
+                  </p:cNvSpPr>
+                  <p:nvPr/>
+                </p:nvSpPr>
+                <p:spPr>
+                  <a:xfrm>
+                    <a:off x="8239961" y="4543388"/>
+                    <a:ext cx="332591" cy="430887"/>
+                  </a:xfrm>
+                  <a:prstGeom prst="rect">
+                    <a:avLst/>
+                  </a:prstGeom>
+                  <a:blipFill rotWithShape="0">
+                    <a:blip r:embed="rId12"/>
+                    <a:stretch>
+                      <a:fillRect/>
+                    </a:stretch>
+                  </a:blipFill>
+                </p:spPr>
+                <p:txBody>
+                  <a:bodyPr/>
+                  <a:lstStyle/>
+                  <a:p>
+                    <a:r>
+                      <a:rPr lang="en-US">
+                        <a:noFill/>
+                      </a:rPr>
+                      <a:t> </a:t>
+                    </a:r>
+                  </a:p>
+                </p:txBody>
+              </p:sp>
+            </mc:Fallback>
+          </mc:AlternateContent>
+          <p:pic>
+            <p:nvPicPr>
+              <p:cNvPr id="47" name="Picture 46"/>
+              <p:cNvPicPr>
+                <a:picLocks noChangeAspect="1"/>
+              </p:cNvPicPr>
+              <p:nvPr/>
+            </p:nvPicPr>
+            <p:blipFill>
+              <a:blip r:embed="rId11">
+                <a:extLst>
+                  <a:ext uri="{28A0092B-C50C-407E-A947-70E740481C1C}">
+                    <a14:useLocalDpi xmlns:a14="http://schemas.microsoft.com/office/drawing/2010/main" val="0"/>
+                  </a:ext>
+                </a:extLst>
+              </a:blip>
+              <a:stretch>
+                <a:fillRect/>
+              </a:stretch>
+            </p:blipFill>
+            <p:spPr>
+              <a:xfrm>
+                <a:off x="8469128" y="4835925"/>
+                <a:ext cx="154394" cy="162972"/>
+              </a:xfrm>
+              <a:prstGeom prst="rect">
+                <a:avLst/>
+              </a:prstGeom>
+            </p:spPr>
+          </p:pic>
+        </p:grpSp>
+        <mc:AlternateContent xmlns:mc="http://schemas.openxmlformats.org/markup-compatibility/2006">
+          <mc:Choice xmlns:a14="http://schemas.microsoft.com/office/drawing/2010/main" Requires="a14">
+            <p:sp>
+              <p:nvSpPr>
+                <p:cNvPr id="48" name="TextBox 47"/>
+                <p:cNvSpPr txBox="1"/>
+                <p:nvPr/>
+              </p:nvSpPr>
+              <p:spPr>
+                <a:xfrm>
+                  <a:off x="7228839" y="4410848"/>
+                  <a:ext cx="473335" cy="472950"/>
+                </a:xfrm>
+                <a:prstGeom prst="rect">
+                  <a:avLst/>
+                </a:prstGeom>
+                <a:noFill/>
+              </p:spPr>
+              <p:txBody>
+                <a:bodyPr wrap="none" lIns="0" tIns="0" rIns="0" bIns="0" rtlCol="0">
+                  <a:spAutoFit/>
+                </a:bodyPr>
+                <a:lstStyle/>
+                <a:p>
+                  <a:pPr/>
+                  <a14:m>
+                    <m:oMathPara xmlns:m="http://schemas.openxmlformats.org/officeDocument/2006/math">
+                      <m:oMathParaPr>
+                        <m:jc m:val="centerGroup"/>
+                      </m:oMathParaPr>
+                      <m:oMath xmlns:m="http://schemas.openxmlformats.org/officeDocument/2006/math">
+                        <m:sSub>
+                          <m:sSubPr>
+                            <m:ctrlPr>
+                              <a:rPr lang="en-US" sz="2800" b="0" i="1" smtClean="0">
+                                <a:latin typeface="Cambria Math" charset="0"/>
+                              </a:rPr>
+                            </m:ctrlPr>
+                          </m:sSubPr>
+                          <m:e>
+                            <m:acc>
+                              <m:accPr>
+                                <m:chr m:val="⃗"/>
+                                <m:ctrlPr>
+                                  <a:rPr lang="en-US" sz="2800" i="1" smtClean="0">
+                                    <a:latin typeface="Cambria Math" charset="0"/>
+                                  </a:rPr>
+                                </m:ctrlPr>
+                              </m:accPr>
+                              <m:e>
+                                <m:r>
+                                  <a:rPr lang="en-US" sz="2800" b="0" i="1" smtClean="0">
+                                    <a:latin typeface="Cambria Math" charset="0"/>
+                                  </a:rPr>
+                                  <m:t>𝑟</m:t>
+                                </m:r>
+                              </m:e>
+                            </m:acc>
+                          </m:e>
+                          <m:sub>
+                            <m:sSub>
+                              <m:sSubPr>
+                                <m:ctrlPr>
+                                  <a:rPr lang="en-US" sz="2800" i="1">
+                                    <a:latin typeface="Cambria Math" charset="0"/>
+                                  </a:rPr>
+                                </m:ctrlPr>
+                              </m:sSubPr>
+                              <m:e>
+                                <m:r>
+                                  <a:rPr lang="en-US" sz="2800" i="1">
+                                    <a:latin typeface="Cambria Math" charset="0"/>
+                                  </a:rPr>
+                                  <m:t>𝒥</m:t>
+                                </m:r>
+                              </m:e>
+                              <m:sub>
+                                <m:r>
+                                  <a:rPr lang="en-US" sz="2800" i="1">
+                                    <a:latin typeface="Cambria Math" charset="0"/>
+                                  </a:rPr>
+                                  <m:t>𝑖</m:t>
+                                </m:r>
+                              </m:sub>
+                            </m:sSub>
+                          </m:sub>
+                        </m:sSub>
+                      </m:oMath>
+                    </m:oMathPara>
+                  </a14:m>
+                  <a:endParaRPr lang="en-US" sz="2800" dirty="0"/>
+                </a:p>
+              </p:txBody>
+            </p:sp>
+          </mc:Choice>
+          <mc:Fallback>
+            <p:sp>
+              <p:nvSpPr>
+                <p:cNvPr id="48" name="TextBox 47"/>
+                <p:cNvSpPr txBox="1">
+                  <a:spLocks noRot="1" noChangeAspect="1" noMove="1" noResize="1" noEditPoints="1" noAdjustHandles="1" noChangeArrowheads="1" noChangeShapeType="1" noTextEdit="1"/>
+                </p:cNvSpPr>
+                <p:nvPr/>
+              </p:nvSpPr>
+              <p:spPr>
+                <a:xfrm>
+                  <a:off x="7228839" y="4410848"/>
+                  <a:ext cx="473335" cy="472950"/>
+                </a:xfrm>
+                <a:prstGeom prst="rect">
+                  <a:avLst/>
+                </a:prstGeom>
+                <a:blipFill rotWithShape="0">
+                  <a:blip r:embed="rId13"/>
+                  <a:stretch>
+                    <a:fillRect/>
+                  </a:stretch>
+                </a:blipFill>
+              </p:spPr>
+              <p:txBody>
+                <a:bodyPr/>
+                <a:lstStyle/>
+                <a:p>
+                  <a:r>
+                    <a:rPr lang="en-US">
+                      <a:noFill/>
+                    </a:rPr>
+                    <a:t> </a:t>
+                  </a:r>
+                </a:p>
+              </p:txBody>
+            </p:sp>
+          </mc:Fallback>
+        </mc:AlternateContent>
+        <p:cxnSp>
+          <p:nvCxnSpPr>
+            <p:cNvPr id="53" name="Straight Arrow Connector 52"/>
+            <p:cNvCxnSpPr/>
+            <p:nvPr/>
+          </p:nvCxnSpPr>
+          <p:spPr>
+            <a:xfrm flipV="1">
+              <a:off x="6458992" y="2767075"/>
+              <a:ext cx="547547" cy="1279779"/>
+            </a:xfrm>
+            <a:prstGeom prst="straightConnector1">
+              <a:avLst/>
+            </a:prstGeom>
+            <a:ln w="19050" cmpd="sng">
+              <a:solidFill>
+                <a:schemeClr val="tx1"/>
+              </a:solidFill>
+              <a:headEnd type="none"/>
+              <a:tailEnd type="stealth"/>
+            </a:ln>
+            <a:effectLst/>
+          </p:spPr>
+          <p:style>
+            <a:lnRef idx="2">
+              <a:schemeClr val="accent1"/>
+            </a:lnRef>
+            <a:fillRef idx="0">
+              <a:schemeClr val="accent1"/>
+            </a:fillRef>
+            <a:effectRef idx="1">
+              <a:schemeClr val="accent1"/>
+            </a:effectRef>
+            <a:fontRef idx="minor">
+              <a:schemeClr val="tx1"/>
+            </a:fontRef>
+          </p:style>
+        </p:cxnSp>
+        <mc:AlternateContent xmlns:mc="http://schemas.openxmlformats.org/markup-compatibility/2006">
+          <mc:Choice xmlns:a14="http://schemas.microsoft.com/office/drawing/2010/main" Requires="a14">
+            <p:sp>
+              <p:nvSpPr>
+                <p:cNvPr id="57" name="TextBox 56"/>
+                <p:cNvSpPr txBox="1"/>
+                <p:nvPr/>
+              </p:nvSpPr>
+              <p:spPr>
+                <a:xfrm>
+                  <a:off x="6372980" y="2871232"/>
+                  <a:ext cx="404278" cy="430887"/>
+                </a:xfrm>
+                <a:prstGeom prst="rect">
+                  <a:avLst/>
+                </a:prstGeom>
+                <a:noFill/>
+              </p:spPr>
+              <p:txBody>
+                <a:bodyPr wrap="none" lIns="0" tIns="0" rIns="0" bIns="0" rtlCol="0">
+                  <a:spAutoFit/>
+                </a:bodyPr>
+                <a:lstStyle/>
+                <a:p>
+                  <a:pPr/>
+                  <a14:m>
+                    <m:oMathPara xmlns:m="http://schemas.openxmlformats.org/officeDocument/2006/math">
+                      <m:oMathParaPr>
+                        <m:jc m:val="centerGroup"/>
+                      </m:oMathParaPr>
+                      <m:oMath xmlns:m="http://schemas.openxmlformats.org/officeDocument/2006/math">
+                        <m:sSub>
+                          <m:sSubPr>
+                            <m:ctrlPr>
+                              <a:rPr lang="en-US" sz="2800" b="0" i="1" smtClean="0">
+                                <a:latin typeface="Cambria Math" charset="0"/>
+                              </a:rPr>
+                            </m:ctrlPr>
+                          </m:sSubPr>
+                          <m:e>
+                            <m:acc>
+                              <m:accPr>
+                                <m:chr m:val="⃗"/>
+                                <m:ctrlPr>
+                                  <a:rPr lang="en-US" sz="2800" i="1" smtClean="0">
+                                    <a:latin typeface="Cambria Math" charset="0"/>
+                                  </a:rPr>
+                                </m:ctrlPr>
+                              </m:accPr>
+                              <m:e>
+                                <m:r>
+                                  <a:rPr lang="en-US" sz="2800" b="0" i="1" smtClean="0">
+                                    <a:latin typeface="Cambria Math" charset="0"/>
+                                  </a:rPr>
+                                  <m:t>𝑔</m:t>
+                                </m:r>
+                              </m:e>
+                            </m:acc>
+                          </m:e>
+                          <m:sub>
+                            <m:r>
+                              <a:rPr lang="en-US" sz="2800" b="0" i="1" smtClean="0">
+                                <a:latin typeface="Cambria Math" charset="0"/>
+                              </a:rPr>
+                              <m:t>𝑖</m:t>
+                            </m:r>
+                          </m:sub>
+                        </m:sSub>
+                      </m:oMath>
+                    </m:oMathPara>
+                  </a14:m>
+                  <a:endParaRPr lang="en-US" sz="2800" dirty="0"/>
+                </a:p>
+              </p:txBody>
+            </p:sp>
+          </mc:Choice>
+          <mc:Fallback>
+            <p:sp>
+              <p:nvSpPr>
+                <p:cNvPr id="57" name="TextBox 56"/>
+                <p:cNvSpPr txBox="1">
+                  <a:spLocks noRot="1" noChangeAspect="1" noMove="1" noResize="1" noEditPoints="1" noAdjustHandles="1" noChangeArrowheads="1" noChangeShapeType="1" noTextEdit="1"/>
+                </p:cNvSpPr>
+                <p:nvPr/>
+              </p:nvSpPr>
+              <p:spPr>
+                <a:xfrm>
+                  <a:off x="6372980" y="2871232"/>
+                  <a:ext cx="404278" cy="430887"/>
+                </a:xfrm>
+                <a:prstGeom prst="rect">
+                  <a:avLst/>
+                </a:prstGeom>
+                <a:blipFill rotWithShape="0">
+                  <a:blip r:embed="rId14"/>
+                  <a:stretch>
+                    <a:fillRect/>
+                  </a:stretch>
+                </a:blipFill>
+              </p:spPr>
+              <p:txBody>
+                <a:bodyPr/>
+                <a:lstStyle/>
+                <a:p>
+                  <a:r>
+                    <a:rPr lang="en-US">
+                      <a:noFill/>
+                    </a:rPr>
+                    <a:t> </a:t>
+                  </a:r>
+                </a:p>
+              </p:txBody>
+            </p:sp>
+          </mc:Fallback>
+        </mc:AlternateContent>
+      </p:grpSp>
+    </p:spTree>
+    <p:extLst>
+      <p:ext uri="{BB962C8B-B14F-4D97-AF65-F5344CB8AC3E}">
+        <p14:creationId xmlns:p14="http://schemas.microsoft.com/office/powerpoint/2010/main" val="141345469"/>
       </p:ext>
     </p:extLst>
   </p:cSld>

</xml_diff>